<commit_message>
3rd batch for IntegrateWebApi session
Batch commits for the 3rd IntegrationWebApi session, including source &
presentation document.
</commit_message>
<xml_diff>
--- a/doc/02_IntegrateHighchart/02_IntegrateHighchart.pptx
+++ b/doc/02_IntegrateHighchart/02_IntegrateHighchart.pptx
@@ -23,8 +23,8 @@
     <p:sldId id="292" r:id="rId12"/>
     <p:sldId id="293" r:id="rId13"/>
     <p:sldId id="294" r:id="rId14"/>
-    <p:sldId id="295" r:id="rId15"/>
-    <p:sldId id="296" r:id="rId16"/>
+    <p:sldId id="296" r:id="rId15"/>
+    <p:sldId id="295" r:id="rId16"/>
     <p:sldId id="333" r:id="rId17"/>
     <p:sldId id="335" r:id="rId18"/>
     <p:sldId id="334" r:id="rId19"/>
@@ -267,7 +267,7 @@
           <a:p>
             <a:fld id="{762B48F5-BACC-47D6-A0F7-82FBF9C6BC85}" type="datetimeFigureOut">
               <a:rPr lang="en-US"/>
-              <a:t>12/3/2014</a:t>
+              <a:t>12/4/2014</a:t>
             </a:fld>
             <a:endParaRPr/>
           </a:p>
@@ -432,7 +432,7 @@
           <a:p>
             <a:fld id="{0CB1CD00-5424-4675-AB18-2C419B060449}" type="datetimeFigureOut">
               <a:rPr lang="en-US"/>
-              <a:t>12/3/2014</a:t>
+              <a:t>12/4/2014</a:t>
             </a:fld>
             <a:endParaRPr/>
           </a:p>
@@ -2011,7 +2011,7 @@
     </p:spTree>
     <p:extLst>
       <p:ext uri="{BB962C8B-B14F-4D97-AF65-F5344CB8AC3E}">
-        <p14:creationId xmlns:p14="http://schemas.microsoft.com/office/powerpoint/2010/main" val="1172722639"/>
+        <p14:creationId xmlns:p14="http://schemas.microsoft.com/office/powerpoint/2010/main" val="1042833334"/>
       </p:ext>
     </p:extLst>
   </p:cSld>
@@ -2095,7 +2095,7 @@
     </p:spTree>
     <p:extLst>
       <p:ext uri="{BB962C8B-B14F-4D97-AF65-F5344CB8AC3E}">
-        <p14:creationId xmlns:p14="http://schemas.microsoft.com/office/powerpoint/2010/main" val="1042833334"/>
+        <p14:creationId xmlns:p14="http://schemas.microsoft.com/office/powerpoint/2010/main" val="1172722639"/>
       </p:ext>
     </p:extLst>
   </p:cSld>
@@ -9014,7 +9014,7 @@
           <a:p>
             <a:fld id="{37CC0096-1860-4642-9CD2-0079EA5E7CD1}" type="datetimeFigureOut">
               <a:rPr lang="en-US" smtClean="0"/>
-              <a:t>12/3/2014</a:t>
+              <a:t>12/4/2014</a:t>
             </a:fld>
             <a:endParaRPr lang="en-US"/>
           </a:p>
@@ -9209,7 +9209,7 @@
           <a:p>
             <a:fld id="{37CC0096-1860-4642-9CD2-0079EA5E7CD1}" type="datetimeFigureOut">
               <a:rPr lang="en-US" smtClean="0"/>
-              <a:t>12/3/2014</a:t>
+              <a:t>12/4/2014</a:t>
             </a:fld>
             <a:endParaRPr lang="en-US"/>
           </a:p>
@@ -9398,7 +9398,7 @@
           <a:p>
             <a:fld id="{37CC0096-1860-4642-9CD2-0079EA5E7CD1}" type="datetimeFigureOut">
               <a:rPr lang="en-US" smtClean="0"/>
-              <a:t>12/3/2014</a:t>
+              <a:t>12/4/2014</a:t>
             </a:fld>
             <a:endParaRPr lang="en-US"/>
           </a:p>
@@ -9863,7 +9863,7 @@
           <a:p>
             <a:fld id="{37CC0096-1860-4642-9CD2-0079EA5E7CD1}" type="datetimeFigureOut">
               <a:rPr lang="en-US" smtClean="0"/>
-              <a:t>12/3/2014</a:t>
+              <a:t>12/4/2014</a:t>
             </a:fld>
             <a:endParaRPr lang="en-US"/>
           </a:p>
@@ -10318,7 +10318,7 @@
           <a:p>
             <a:fld id="{37CC0096-1860-4642-9CD2-0079EA5E7CD1}" type="datetimeFigureOut">
               <a:rPr lang="en-US" smtClean="0"/>
-              <a:t>12/3/2014</a:t>
+              <a:t>12/4/2014</a:t>
             </a:fld>
             <a:endParaRPr lang="en-US"/>
           </a:p>
@@ -10451,7 +10451,7 @@
           <a:p>
             <a:fld id="{37CC0096-1860-4642-9CD2-0079EA5E7CD1}" type="datetimeFigureOut">
               <a:rPr lang="en-US" smtClean="0"/>
-              <a:t>12/3/2014</a:t>
+              <a:t>12/4/2014</a:t>
             </a:fld>
             <a:endParaRPr lang="en-US"/>
           </a:p>
@@ -10561,7 +10561,7 @@
           <a:p>
             <a:fld id="{37CC0096-1860-4642-9CD2-0079EA5E7CD1}" type="datetimeFigureOut">
               <a:rPr lang="en-US" smtClean="0"/>
-              <a:t>12/3/2014</a:t>
+              <a:t>12/4/2014</a:t>
             </a:fld>
             <a:endParaRPr lang="en-US"/>
           </a:p>
@@ -10860,7 +10860,7 @@
           <a:p>
             <a:fld id="{37CC0096-1860-4642-9CD2-0079EA5E7CD1}" type="datetimeFigureOut">
               <a:rPr lang="en-US" smtClean="0"/>
-              <a:t>12/3/2014</a:t>
+              <a:t>12/4/2014</a:t>
             </a:fld>
             <a:endParaRPr lang="en-US"/>
           </a:p>
@@ -11188,7 +11188,7 @@
           <a:p>
             <a:fld id="{37CC0096-1860-4642-9CD2-0079EA5E7CD1}" type="datetimeFigureOut">
               <a:rPr lang="en-US" smtClean="0"/>
-              <a:t>12/3/2014</a:t>
+              <a:t>12/4/2014</a:t>
             </a:fld>
             <a:endParaRPr lang="en-US"/>
           </a:p>
@@ -11417,7 +11417,7 @@
             <a:fld id="{37CC0096-1860-4642-9CD2-0079EA5E7CD1}" type="datetimeFigureOut">
               <a:rPr lang="en-US"/>
               <a:pPr/>
-              <a:t>12/3/2014</a:t>
+              <a:t>12/4/2014</a:t>
             </a:fld>
             <a:endParaRPr/>
           </a:p>
@@ -13002,6 +13002,344 @@
       </p:grpSpPr>
       <p:pic>
         <p:nvPicPr>
+          <p:cNvPr id="4" name="Picture 3"/>
+          <p:cNvPicPr>
+            <a:picLocks noChangeAspect="1"/>
+          </p:cNvPicPr>
+          <p:nvPr/>
+        </p:nvPicPr>
+        <p:blipFill>
+          <a:blip r:embed="rId3"/>
+          <a:stretch>
+            <a:fillRect/>
+          </a:stretch>
+        </p:blipFill>
+        <p:spPr>
+          <a:xfrm>
+            <a:off x="1775520" y="1623072"/>
+            <a:ext cx="7898072" cy="2880320"/>
+          </a:xfrm>
+          <a:prstGeom prst="rect">
+            <a:avLst/>
+          </a:prstGeom>
+        </p:spPr>
+      </p:pic>
+      <p:sp>
+        <p:nvSpPr>
+          <p:cNvPr id="2" name="Title 1"/>
+          <p:cNvSpPr>
+            <a:spLocks noGrp="1"/>
+          </p:cNvSpPr>
+          <p:nvPr>
+            <p:ph type="title"/>
+          </p:nvPr>
+        </p:nvSpPr>
+        <p:spPr/>
+        <p:txBody>
+          <a:bodyPr>
+            <a:normAutofit/>
+          </a:bodyPr>
+          <a:lstStyle/>
+          <a:p>
+            <a:r>
+              <a:rPr lang="en-US" dirty="0"/>
+              <a:t>SPA Skelton </a:t>
+            </a:r>
+            <a:r>
+              <a:rPr lang="en-US" dirty="0" smtClean="0"/>
+              <a:t>(Partials/home.html &amp; Partials/home-list.html)</a:t>
+            </a:r>
+            <a:endParaRPr dirty="0"/>
+          </a:p>
+        </p:txBody>
+      </p:sp>
+      <p:sp>
+        <p:nvSpPr>
+          <p:cNvPr id="11" name="Rectangle 10"/>
+          <p:cNvSpPr/>
+          <p:nvPr/>
+        </p:nvSpPr>
+        <p:spPr>
+          <a:xfrm>
+            <a:off x="2135560" y="4034649"/>
+            <a:ext cx="1669390" cy="468744"/>
+          </a:xfrm>
+          <a:prstGeom prst="rect">
+            <a:avLst/>
+          </a:prstGeom>
+          <a:noFill/>
+          <a:ln w="28575">
+            <a:solidFill>
+              <a:schemeClr val="accent1">
+                <a:lumMod val="60000"/>
+                <a:lumOff val="40000"/>
+              </a:schemeClr>
+            </a:solidFill>
+          </a:ln>
+        </p:spPr>
+        <p:style>
+          <a:lnRef idx="2">
+            <a:schemeClr val="accent1">
+              <a:shade val="50000"/>
+            </a:schemeClr>
+          </a:lnRef>
+          <a:fillRef idx="1">
+            <a:schemeClr val="accent1"/>
+          </a:fillRef>
+          <a:effectRef idx="0">
+            <a:schemeClr val="accent1"/>
+          </a:effectRef>
+          <a:fontRef idx="minor">
+            <a:schemeClr val="lt1"/>
+          </a:fontRef>
+        </p:style>
+        <p:txBody>
+          <a:bodyPr rtlCol="0" anchor="ctr"/>
+          <a:lstStyle/>
+          <a:p>
+            <a:pPr algn="ctr"/>
+            <a:endParaRPr lang="en-US"/>
+          </a:p>
+        </p:txBody>
+      </p:sp>
+      <p:sp>
+        <p:nvSpPr>
+          <p:cNvPr id="12" name="Rectangle 11"/>
+          <p:cNvSpPr/>
+          <p:nvPr/>
+        </p:nvSpPr>
+        <p:spPr>
+          <a:xfrm>
+            <a:off x="2565530" y="2988846"/>
+            <a:ext cx="5618701" cy="463239"/>
+          </a:xfrm>
+          <a:prstGeom prst="rect">
+            <a:avLst/>
+          </a:prstGeom>
+          <a:noFill/>
+          <a:ln w="28575">
+            <a:solidFill>
+              <a:schemeClr val="accent1">
+                <a:lumMod val="60000"/>
+                <a:lumOff val="40000"/>
+              </a:schemeClr>
+            </a:solidFill>
+          </a:ln>
+        </p:spPr>
+        <p:style>
+          <a:lnRef idx="2">
+            <a:schemeClr val="accent1">
+              <a:shade val="50000"/>
+            </a:schemeClr>
+          </a:lnRef>
+          <a:fillRef idx="1">
+            <a:schemeClr val="accent1"/>
+          </a:fillRef>
+          <a:effectRef idx="0">
+            <a:schemeClr val="accent1"/>
+          </a:effectRef>
+          <a:fontRef idx="minor">
+            <a:schemeClr val="lt1"/>
+          </a:fontRef>
+        </p:style>
+        <p:txBody>
+          <a:bodyPr rtlCol="0" anchor="ctr"/>
+          <a:lstStyle/>
+          <a:p>
+            <a:pPr algn="ctr"/>
+            <a:endParaRPr lang="en-US"/>
+          </a:p>
+        </p:txBody>
+      </p:sp>
+      <p:pic>
+        <p:nvPicPr>
+          <p:cNvPr id="13" name="Picture 2" descr="Picture"/>
+          <p:cNvPicPr>
+            <a:picLocks noChangeAspect="1" noChangeArrowheads="1"/>
+          </p:cNvPicPr>
+          <p:nvPr/>
+        </p:nvPicPr>
+        <p:blipFill>
+          <a:blip r:embed="rId4" cstate="print">
+            <a:extLst>
+              <a:ext uri="{28A0092B-C50C-407E-A947-70E740481C1C}">
+                <a14:useLocalDpi xmlns:a14="http://schemas.microsoft.com/office/drawing/2010/main" val="0"/>
+              </a:ext>
+            </a:extLst>
+          </a:blip>
+          <a:srcRect/>
+          <a:stretch>
+            <a:fillRect/>
+          </a:stretch>
+        </p:blipFill>
+        <p:spPr bwMode="auto">
+          <a:xfrm>
+            <a:off x="1084663" y="2326451"/>
+            <a:ext cx="461032" cy="461032"/>
+          </a:xfrm>
+          <a:prstGeom prst="rect">
+            <a:avLst/>
+          </a:prstGeom>
+          <a:noFill/>
+          <a:extLst>
+            <a:ext uri="{909E8E84-426E-40DD-AFC4-6F175D3DCCD1}">
+              <a14:hiddenFill xmlns:a14="http://schemas.microsoft.com/office/drawing/2010/main">
+                <a:solidFill>
+                  <a:srgbClr val="FFFFFF"/>
+                </a:solidFill>
+              </a14:hiddenFill>
+            </a:ext>
+          </a:extLst>
+        </p:spPr>
+      </p:pic>
+      <p:pic>
+        <p:nvPicPr>
+          <p:cNvPr id="14" name="Picture 4" descr="Picture"/>
+          <p:cNvPicPr>
+            <a:picLocks noChangeAspect="1" noChangeArrowheads="1"/>
+          </p:cNvPicPr>
+          <p:nvPr/>
+        </p:nvPicPr>
+        <p:blipFill>
+          <a:blip r:embed="rId5" cstate="print">
+            <a:extLst>
+              <a:ext uri="{28A0092B-C50C-407E-A947-70E740481C1C}">
+                <a14:useLocalDpi xmlns:a14="http://schemas.microsoft.com/office/drawing/2010/main" val="0"/>
+              </a:ext>
+            </a:extLst>
+          </a:blip>
+          <a:srcRect/>
+          <a:stretch>
+            <a:fillRect/>
+          </a:stretch>
+        </p:blipFill>
+        <p:spPr bwMode="auto">
+          <a:xfrm>
+            <a:off x="3918207" y="4034649"/>
+            <a:ext cx="436758" cy="436758"/>
+          </a:xfrm>
+          <a:prstGeom prst="rect">
+            <a:avLst/>
+          </a:prstGeom>
+          <a:noFill/>
+          <a:extLst>
+            <a:ext uri="{909E8E84-426E-40DD-AFC4-6F175D3DCCD1}">
+              <a14:hiddenFill xmlns:a14="http://schemas.microsoft.com/office/drawing/2010/main">
+                <a:solidFill>
+                  <a:srgbClr val="FFFFFF"/>
+                </a:solidFill>
+              </a14:hiddenFill>
+            </a:ext>
+          </a:extLst>
+        </p:spPr>
+      </p:pic>
+      <p:pic>
+        <p:nvPicPr>
+          <p:cNvPr id="6" name="Picture 5"/>
+          <p:cNvPicPr>
+            <a:picLocks noChangeAspect="1"/>
+          </p:cNvPicPr>
+          <p:nvPr/>
+        </p:nvPicPr>
+        <p:blipFill>
+          <a:blip r:embed="rId6"/>
+          <a:stretch>
+            <a:fillRect/>
+          </a:stretch>
+        </p:blipFill>
+        <p:spPr>
+          <a:xfrm>
+            <a:off x="1775519" y="4852001"/>
+            <a:ext cx="4922561" cy="1385311"/>
+          </a:xfrm>
+          <a:prstGeom prst="rect">
+            <a:avLst/>
+          </a:prstGeom>
+        </p:spPr>
+      </p:pic>
+      <p:pic>
+        <p:nvPicPr>
+          <p:cNvPr id="16" name="Picture 6" descr="Picture"/>
+          <p:cNvPicPr>
+            <a:picLocks noChangeAspect="1" noChangeArrowheads="1"/>
+          </p:cNvPicPr>
+          <p:nvPr/>
+        </p:nvPicPr>
+        <p:blipFill>
+          <a:blip r:embed="rId7" cstate="print">
+            <a:extLst>
+              <a:ext uri="{28A0092B-C50C-407E-A947-70E740481C1C}">
+                <a14:useLocalDpi xmlns:a14="http://schemas.microsoft.com/office/drawing/2010/main" val="0"/>
+              </a:ext>
+            </a:extLst>
+          </a:blip>
+          <a:srcRect/>
+          <a:stretch>
+            <a:fillRect/>
+          </a:stretch>
+        </p:blipFill>
+        <p:spPr bwMode="auto">
+          <a:xfrm>
+            <a:off x="1725138" y="5524072"/>
+            <a:ext cx="410422" cy="410422"/>
+          </a:xfrm>
+          <a:prstGeom prst="rect">
+            <a:avLst/>
+          </a:prstGeom>
+          <a:noFill/>
+          <a:extLst>
+            <a:ext uri="{909E8E84-426E-40DD-AFC4-6F175D3DCCD1}">
+              <a14:hiddenFill xmlns:a14="http://schemas.microsoft.com/office/drawing/2010/main">
+                <a:solidFill>
+                  <a:srgbClr val="FFFFFF"/>
+                </a:solidFill>
+              </a14:hiddenFill>
+            </a:ext>
+          </a:extLst>
+        </p:spPr>
+      </p:pic>
+    </p:spTree>
+    <p:extLst>
+      <p:ext uri="{BB962C8B-B14F-4D97-AF65-F5344CB8AC3E}">
+        <p14:creationId xmlns:p14="http://schemas.microsoft.com/office/powerpoint/2010/main" val="3445427952"/>
+      </p:ext>
+    </p:extLst>
+  </p:cSld>
+  <p:clrMapOvr>
+    <a:masterClrMapping/>
+  </p:clrMapOvr>
+  <p:transition spd="slow">
+    <p:pull/>
+  </p:transition>
+  <p:timing>
+    <p:tnLst>
+      <p:par>
+        <p:cTn id="1" dur="indefinite" restart="never" nodeType="tmRoot"/>
+      </p:par>
+    </p:tnLst>
+  </p:timing>
+</p:sld>
+</file>
+
+<file path=ppt/slides/slide14.xml><?xml version="1.0" encoding="utf-8"?>
+<p:sld xmlns:a="http://schemas.openxmlformats.org/drawingml/2006/main" xmlns:r="http://schemas.openxmlformats.org/officeDocument/2006/relationships" xmlns:p="http://schemas.openxmlformats.org/presentationml/2006/main">
+  <p:cSld>
+    <p:spTree>
+      <p:nvGrpSpPr>
+        <p:cNvPr id="1" name=""/>
+        <p:cNvGrpSpPr/>
+        <p:nvPr/>
+      </p:nvGrpSpPr>
+      <p:grpSpPr>
+        <a:xfrm>
+          <a:off x="0" y="0"/>
+          <a:ext cx="0" cy="0"/>
+          <a:chOff x="0" y="0"/>
+          <a:chExt cx="0" cy="0"/>
+        </a:xfrm>
+      </p:grpSpPr>
+      <p:pic>
+        <p:nvPicPr>
           <p:cNvPr id="3" name="Picture 2"/>
           <p:cNvPicPr>
             <a:picLocks noChangeAspect="1"/>
@@ -13045,19 +13383,7 @@
             </a:r>
             <a:r>
               <a:rPr lang="en-US" dirty="0" smtClean="0"/>
-              <a:t>**</a:t>
-            </a:r>
-            <a:r>
-              <a:rPr lang="en-US" dirty="0" smtClean="0"/>
-              <a:t>page routing** </a:t>
-            </a:r>
-            <a:r>
-              <a:rPr lang="en-US" dirty="0" smtClean="0"/>
-              <a:t>(app.js</a:t>
-            </a:r>
-            <a:r>
-              <a:rPr lang="en-US" dirty="0" smtClean="0"/>
-              <a:t>)</a:t>
+              <a:t>**page routing** (app.js)</a:t>
             </a:r>
             <a:endParaRPr dirty="0"/>
           </a:p>
@@ -13701,344 +14027,6 @@
     <p:extLst>
       <p:ext uri="{BB962C8B-B14F-4D97-AF65-F5344CB8AC3E}">
         <p14:creationId xmlns:p14="http://schemas.microsoft.com/office/powerpoint/2010/main" val="803141917"/>
-      </p:ext>
-    </p:extLst>
-  </p:cSld>
-  <p:clrMapOvr>
-    <a:masterClrMapping/>
-  </p:clrMapOvr>
-  <p:transition spd="slow">
-    <p:pull/>
-  </p:transition>
-  <p:timing>
-    <p:tnLst>
-      <p:par>
-        <p:cTn id="1" dur="indefinite" restart="never" nodeType="tmRoot"/>
-      </p:par>
-    </p:tnLst>
-  </p:timing>
-</p:sld>
-</file>
-
-<file path=ppt/slides/slide14.xml><?xml version="1.0" encoding="utf-8"?>
-<p:sld xmlns:a="http://schemas.openxmlformats.org/drawingml/2006/main" xmlns:r="http://schemas.openxmlformats.org/officeDocument/2006/relationships" xmlns:p="http://schemas.openxmlformats.org/presentationml/2006/main">
-  <p:cSld>
-    <p:spTree>
-      <p:nvGrpSpPr>
-        <p:cNvPr id="1" name=""/>
-        <p:cNvGrpSpPr/>
-        <p:nvPr/>
-      </p:nvGrpSpPr>
-      <p:grpSpPr>
-        <a:xfrm>
-          <a:off x="0" y="0"/>
-          <a:ext cx="0" cy="0"/>
-          <a:chOff x="0" y="0"/>
-          <a:chExt cx="0" cy="0"/>
-        </a:xfrm>
-      </p:grpSpPr>
-      <p:pic>
-        <p:nvPicPr>
-          <p:cNvPr id="4" name="Picture 3"/>
-          <p:cNvPicPr>
-            <a:picLocks noChangeAspect="1"/>
-          </p:cNvPicPr>
-          <p:nvPr/>
-        </p:nvPicPr>
-        <p:blipFill>
-          <a:blip r:embed="rId3"/>
-          <a:stretch>
-            <a:fillRect/>
-          </a:stretch>
-        </p:blipFill>
-        <p:spPr>
-          <a:xfrm>
-            <a:off x="1775520" y="1623072"/>
-            <a:ext cx="7898072" cy="2880320"/>
-          </a:xfrm>
-          <a:prstGeom prst="rect">
-            <a:avLst/>
-          </a:prstGeom>
-        </p:spPr>
-      </p:pic>
-      <p:sp>
-        <p:nvSpPr>
-          <p:cNvPr id="2" name="Title 1"/>
-          <p:cNvSpPr>
-            <a:spLocks noGrp="1"/>
-          </p:cNvSpPr>
-          <p:nvPr>
-            <p:ph type="title"/>
-          </p:nvPr>
-        </p:nvSpPr>
-        <p:spPr/>
-        <p:txBody>
-          <a:bodyPr>
-            <a:normAutofit/>
-          </a:bodyPr>
-          <a:lstStyle/>
-          <a:p>
-            <a:r>
-              <a:rPr lang="en-US" dirty="0"/>
-              <a:t>SPA Skelton </a:t>
-            </a:r>
-            <a:r>
-              <a:rPr lang="en-US" dirty="0" smtClean="0"/>
-              <a:t>(Partials/home.html &amp; Partials/home-list.html)</a:t>
-            </a:r>
-            <a:endParaRPr dirty="0"/>
-          </a:p>
-        </p:txBody>
-      </p:sp>
-      <p:sp>
-        <p:nvSpPr>
-          <p:cNvPr id="11" name="Rectangle 10"/>
-          <p:cNvSpPr/>
-          <p:nvPr/>
-        </p:nvSpPr>
-        <p:spPr>
-          <a:xfrm>
-            <a:off x="2135560" y="4034649"/>
-            <a:ext cx="1669390" cy="468744"/>
-          </a:xfrm>
-          <a:prstGeom prst="rect">
-            <a:avLst/>
-          </a:prstGeom>
-          <a:noFill/>
-          <a:ln w="28575">
-            <a:solidFill>
-              <a:schemeClr val="accent1">
-                <a:lumMod val="60000"/>
-                <a:lumOff val="40000"/>
-              </a:schemeClr>
-            </a:solidFill>
-          </a:ln>
-        </p:spPr>
-        <p:style>
-          <a:lnRef idx="2">
-            <a:schemeClr val="accent1">
-              <a:shade val="50000"/>
-            </a:schemeClr>
-          </a:lnRef>
-          <a:fillRef idx="1">
-            <a:schemeClr val="accent1"/>
-          </a:fillRef>
-          <a:effectRef idx="0">
-            <a:schemeClr val="accent1"/>
-          </a:effectRef>
-          <a:fontRef idx="minor">
-            <a:schemeClr val="lt1"/>
-          </a:fontRef>
-        </p:style>
-        <p:txBody>
-          <a:bodyPr rtlCol="0" anchor="ctr"/>
-          <a:lstStyle/>
-          <a:p>
-            <a:pPr algn="ctr"/>
-            <a:endParaRPr lang="en-US"/>
-          </a:p>
-        </p:txBody>
-      </p:sp>
-      <p:sp>
-        <p:nvSpPr>
-          <p:cNvPr id="12" name="Rectangle 11"/>
-          <p:cNvSpPr/>
-          <p:nvPr/>
-        </p:nvSpPr>
-        <p:spPr>
-          <a:xfrm>
-            <a:off x="2565530" y="2988846"/>
-            <a:ext cx="5618701" cy="463239"/>
-          </a:xfrm>
-          <a:prstGeom prst="rect">
-            <a:avLst/>
-          </a:prstGeom>
-          <a:noFill/>
-          <a:ln w="28575">
-            <a:solidFill>
-              <a:schemeClr val="accent1">
-                <a:lumMod val="60000"/>
-                <a:lumOff val="40000"/>
-              </a:schemeClr>
-            </a:solidFill>
-          </a:ln>
-        </p:spPr>
-        <p:style>
-          <a:lnRef idx="2">
-            <a:schemeClr val="accent1">
-              <a:shade val="50000"/>
-            </a:schemeClr>
-          </a:lnRef>
-          <a:fillRef idx="1">
-            <a:schemeClr val="accent1"/>
-          </a:fillRef>
-          <a:effectRef idx="0">
-            <a:schemeClr val="accent1"/>
-          </a:effectRef>
-          <a:fontRef idx="minor">
-            <a:schemeClr val="lt1"/>
-          </a:fontRef>
-        </p:style>
-        <p:txBody>
-          <a:bodyPr rtlCol="0" anchor="ctr"/>
-          <a:lstStyle/>
-          <a:p>
-            <a:pPr algn="ctr"/>
-            <a:endParaRPr lang="en-US"/>
-          </a:p>
-        </p:txBody>
-      </p:sp>
-      <p:pic>
-        <p:nvPicPr>
-          <p:cNvPr id="13" name="Picture 2" descr="Picture"/>
-          <p:cNvPicPr>
-            <a:picLocks noChangeAspect="1" noChangeArrowheads="1"/>
-          </p:cNvPicPr>
-          <p:nvPr/>
-        </p:nvPicPr>
-        <p:blipFill>
-          <a:blip r:embed="rId4" cstate="print">
-            <a:extLst>
-              <a:ext uri="{28A0092B-C50C-407E-A947-70E740481C1C}">
-                <a14:useLocalDpi xmlns:a14="http://schemas.microsoft.com/office/drawing/2010/main" val="0"/>
-              </a:ext>
-            </a:extLst>
-          </a:blip>
-          <a:srcRect/>
-          <a:stretch>
-            <a:fillRect/>
-          </a:stretch>
-        </p:blipFill>
-        <p:spPr bwMode="auto">
-          <a:xfrm>
-            <a:off x="1084663" y="2326451"/>
-            <a:ext cx="461032" cy="461032"/>
-          </a:xfrm>
-          <a:prstGeom prst="rect">
-            <a:avLst/>
-          </a:prstGeom>
-          <a:noFill/>
-          <a:extLst>
-            <a:ext uri="{909E8E84-426E-40DD-AFC4-6F175D3DCCD1}">
-              <a14:hiddenFill xmlns:a14="http://schemas.microsoft.com/office/drawing/2010/main">
-                <a:solidFill>
-                  <a:srgbClr val="FFFFFF"/>
-                </a:solidFill>
-              </a14:hiddenFill>
-            </a:ext>
-          </a:extLst>
-        </p:spPr>
-      </p:pic>
-      <p:pic>
-        <p:nvPicPr>
-          <p:cNvPr id="14" name="Picture 4" descr="Picture"/>
-          <p:cNvPicPr>
-            <a:picLocks noChangeAspect="1" noChangeArrowheads="1"/>
-          </p:cNvPicPr>
-          <p:nvPr/>
-        </p:nvPicPr>
-        <p:blipFill>
-          <a:blip r:embed="rId5" cstate="print">
-            <a:extLst>
-              <a:ext uri="{28A0092B-C50C-407E-A947-70E740481C1C}">
-                <a14:useLocalDpi xmlns:a14="http://schemas.microsoft.com/office/drawing/2010/main" val="0"/>
-              </a:ext>
-            </a:extLst>
-          </a:blip>
-          <a:srcRect/>
-          <a:stretch>
-            <a:fillRect/>
-          </a:stretch>
-        </p:blipFill>
-        <p:spPr bwMode="auto">
-          <a:xfrm>
-            <a:off x="3918207" y="4034649"/>
-            <a:ext cx="436758" cy="436758"/>
-          </a:xfrm>
-          <a:prstGeom prst="rect">
-            <a:avLst/>
-          </a:prstGeom>
-          <a:noFill/>
-          <a:extLst>
-            <a:ext uri="{909E8E84-426E-40DD-AFC4-6F175D3DCCD1}">
-              <a14:hiddenFill xmlns:a14="http://schemas.microsoft.com/office/drawing/2010/main">
-                <a:solidFill>
-                  <a:srgbClr val="FFFFFF"/>
-                </a:solidFill>
-              </a14:hiddenFill>
-            </a:ext>
-          </a:extLst>
-        </p:spPr>
-      </p:pic>
-      <p:pic>
-        <p:nvPicPr>
-          <p:cNvPr id="6" name="Picture 5"/>
-          <p:cNvPicPr>
-            <a:picLocks noChangeAspect="1"/>
-          </p:cNvPicPr>
-          <p:nvPr/>
-        </p:nvPicPr>
-        <p:blipFill>
-          <a:blip r:embed="rId6"/>
-          <a:stretch>
-            <a:fillRect/>
-          </a:stretch>
-        </p:blipFill>
-        <p:spPr>
-          <a:xfrm>
-            <a:off x="1775519" y="4852001"/>
-            <a:ext cx="4922561" cy="1385311"/>
-          </a:xfrm>
-          <a:prstGeom prst="rect">
-            <a:avLst/>
-          </a:prstGeom>
-        </p:spPr>
-      </p:pic>
-      <p:pic>
-        <p:nvPicPr>
-          <p:cNvPr id="16" name="Picture 6" descr="Picture"/>
-          <p:cNvPicPr>
-            <a:picLocks noChangeAspect="1" noChangeArrowheads="1"/>
-          </p:cNvPicPr>
-          <p:nvPr/>
-        </p:nvPicPr>
-        <p:blipFill>
-          <a:blip r:embed="rId7" cstate="print">
-            <a:extLst>
-              <a:ext uri="{28A0092B-C50C-407E-A947-70E740481C1C}">
-                <a14:useLocalDpi xmlns:a14="http://schemas.microsoft.com/office/drawing/2010/main" val="0"/>
-              </a:ext>
-            </a:extLst>
-          </a:blip>
-          <a:srcRect/>
-          <a:stretch>
-            <a:fillRect/>
-          </a:stretch>
-        </p:blipFill>
-        <p:spPr bwMode="auto">
-          <a:xfrm>
-            <a:off x="1725138" y="5524072"/>
-            <a:ext cx="410422" cy="410422"/>
-          </a:xfrm>
-          <a:prstGeom prst="rect">
-            <a:avLst/>
-          </a:prstGeom>
-          <a:noFill/>
-          <a:extLst>
-            <a:ext uri="{909E8E84-426E-40DD-AFC4-6F175D3DCCD1}">
-              <a14:hiddenFill xmlns:a14="http://schemas.microsoft.com/office/drawing/2010/main">
-                <a:solidFill>
-                  <a:srgbClr val="FFFFFF"/>
-                </a:solidFill>
-              </a14:hiddenFill>
-            </a:ext>
-          </a:extLst>
-        </p:spPr>
-      </p:pic>
-    </p:spTree>
-    <p:extLst>
-      <p:ext uri="{BB962C8B-B14F-4D97-AF65-F5344CB8AC3E}">
-        <p14:creationId xmlns:p14="http://schemas.microsoft.com/office/powerpoint/2010/main" val="3445427952"/>
       </p:ext>
     </p:extLst>
   </p:cSld>
@@ -15672,11 +15660,7 @@
             </a:r>
             <a:r>
               <a:rPr lang="en-US" dirty="0" smtClean="0"/>
-              <a:t>Named Views </a:t>
-            </a:r>
-            <a:r>
-              <a:rPr lang="en-US" dirty="0" smtClean="0"/>
-              <a:t>(modify app.js)</a:t>
+              <a:t>Named Views (modify app.js)</a:t>
             </a:r>
             <a:endParaRPr dirty="0"/>
           </a:p>
@@ -18860,15 +18844,7 @@
           <a:p>
             <a:r>
               <a:rPr lang="en-US" dirty="0" smtClean="0"/>
-              <a:t>Setup </a:t>
-            </a:r>
-            <a:r>
-              <a:rPr lang="en-US" dirty="0" smtClean="0"/>
-              <a:t>Demo SPA </a:t>
-            </a:r>
-            <a:r>
-              <a:rPr lang="en-US" dirty="0" smtClean="0"/>
-              <a:t>Skelton</a:t>
+              <a:t>Setup Demo SPA Skelton</a:t>
             </a:r>
             <a:endParaRPr dirty="0"/>
           </a:p>
@@ -19101,11 +19077,7 @@
             </a:pPr>
             <a:r>
               <a:rPr lang="en-US" dirty="0" smtClean="0"/>
-              <a:t>Create </a:t>
-            </a:r>
-            <a:r>
-              <a:rPr lang="en-US" dirty="0" smtClean="0"/>
-              <a:t>“</a:t>
+              <a:t>Create “</a:t>
             </a:r>
             <a:r>
               <a:rPr lang="en-US" dirty="0">
@@ -19117,11 +19089,7 @@
             </a:r>
             <a:r>
               <a:rPr lang="en-US" dirty="0" smtClean="0"/>
-              <a:t>” </a:t>
-            </a:r>
-            <a:r>
-              <a:rPr lang="en-US" dirty="0" smtClean="0"/>
-              <a:t>folder under “</a:t>
+              <a:t>” folder under “</a:t>
             </a:r>
             <a:r>
               <a:rPr lang="en-US" dirty="0" err="1" smtClean="0">
@@ -19146,7 +19114,6 @@
               <a:rPr lang="en-US" dirty="0" smtClean="0"/>
               <a:t>Create files and subfolder according to the diagram</a:t>
             </a:r>
-            <a:endParaRPr lang="en-US" dirty="0" smtClean="0"/>
           </a:p>
         </p:txBody>
       </p:sp>
@@ -19231,15 +19198,7 @@
           <a:p>
             <a:r>
               <a:rPr lang="en-US" dirty="0" smtClean="0"/>
-              <a:t>Setup </a:t>
-            </a:r>
-            <a:r>
-              <a:rPr lang="en-US" dirty="0" smtClean="0"/>
-              <a:t>Demo SPA </a:t>
-            </a:r>
-            <a:r>
-              <a:rPr lang="en-US" dirty="0" smtClean="0"/>
-              <a:t>Skelton</a:t>
+              <a:t>Setup Demo SPA Skelton</a:t>
             </a:r>
             <a:endParaRPr dirty="0"/>
           </a:p>
@@ -19582,15 +19541,7 @@
           <a:p>
             <a:r>
               <a:rPr lang="en-US" dirty="0" smtClean="0"/>
-              <a:t>Setup </a:t>
-            </a:r>
-            <a:r>
-              <a:rPr lang="en-US" dirty="0" smtClean="0"/>
-              <a:t>Demo SPA </a:t>
-            </a:r>
-            <a:r>
-              <a:rPr lang="en-US" dirty="0" smtClean="0"/>
-              <a:t>Skelton</a:t>
+              <a:t>Setup Demo SPA Skelton</a:t>
             </a:r>
             <a:endParaRPr dirty="0"/>
           </a:p>
@@ -20335,7 +20286,6 @@
               <a:rPr lang="en-US" dirty="0" smtClean="0"/>
               <a:t>Axes</a:t>
             </a:r>
-            <a:endParaRPr lang="en-US" dirty="0" smtClean="0"/>
           </a:p>
         </p:txBody>
       </p:sp>
@@ -20723,7 +20673,6 @@
               <a:rPr lang="en-US" dirty="0" smtClean="0"/>
               <a:t>To create our first chart, below files need to be modified:</a:t>
             </a:r>
-            <a:endParaRPr lang="en-US" dirty="0" smtClean="0"/>
           </a:p>
         </p:txBody>
       </p:sp>
@@ -23565,13 +23514,6 @@
               </a:rPr>
               <a:t>controller </a:t>
             </a:r>
-            <a:endParaRPr lang="en-US" dirty="0" smtClean="0">
-              <a:solidFill>
-                <a:schemeClr val="accent6">
-                  <a:lumMod val="75000"/>
-                </a:schemeClr>
-              </a:solidFill>
-            </a:endParaRPr>
           </a:p>
           <a:p>
             <a:pPr marL="0" indent="0">
@@ -26316,7 +26258,6 @@
               <a:rPr lang="en-US" dirty="0" smtClean="0"/>
               <a:t> how to generate the chart</a:t>
             </a:r>
-            <a:endParaRPr lang="en-US" dirty="0" smtClean="0"/>
           </a:p>
         </p:txBody>
       </p:sp>
@@ -26674,11 +26615,7 @@
             </a:pPr>
             <a:r>
               <a:rPr lang="en-US" dirty="0" smtClean="0"/>
-              <a:t>Click </a:t>
-            </a:r>
-            <a:r>
-              <a:rPr lang="en-US" dirty="0" smtClean="0"/>
-              <a:t>“</a:t>
+              <a:t>Click “</a:t>
             </a:r>
             <a:r>
               <a:rPr lang="en-US" dirty="0" smtClean="0">
@@ -26690,11 +26627,7 @@
             </a:r>
             <a:r>
               <a:rPr lang="en-US" dirty="0" smtClean="0"/>
-              <a:t>” </a:t>
-            </a:r>
-            <a:r>
-              <a:rPr lang="en-US" dirty="0" smtClean="0"/>
-              <a:t>on the navigation bar</a:t>
+              <a:t>” on the navigation bar</a:t>
             </a:r>
             <a:endParaRPr lang="en-US" dirty="0"/>
           </a:p>
@@ -27712,7 +27645,6 @@
               <a:rPr lang="en-US" dirty="0" smtClean="0"/>
               <a:t>To complete this demo, below files need to be modified:</a:t>
             </a:r>
-            <a:endParaRPr lang="en-US" dirty="0" smtClean="0"/>
           </a:p>
         </p:txBody>
       </p:sp>
@@ -28304,7 +28236,6 @@
               <a:rPr lang="en-US" dirty="0" smtClean="0"/>
               <a:t>” contains code to demonstrates above points</a:t>
             </a:r>
-            <a:endParaRPr lang="en-US" dirty="0" smtClean="0"/>
           </a:p>
         </p:txBody>
       </p:sp>
@@ -28506,279 +28437,9 @@
   <p:timing>
     <p:tnLst>
       <p:par>
-        <p:cTn id="1" dur="indefinite" restart="never" nodeType="tmRoot">
-          <p:childTnLst>
-            <p:seq concurrent="1" nextAc="seek">
-              <p:cTn id="2" dur="indefinite" nodeType="mainSeq">
-                <p:childTnLst>
-                  <p:par>
-                    <p:cTn id="3" fill="hold">
-                      <p:stCondLst>
-                        <p:cond delay="indefinite"/>
-                      </p:stCondLst>
-                      <p:childTnLst>
-                        <p:par>
-                          <p:cTn id="4" fill="hold">
-                            <p:stCondLst>
-                              <p:cond delay="0"/>
-                            </p:stCondLst>
-                            <p:childTnLst>
-                              <p:par>
-                                <p:cTn id="5" presetID="10" presetClass="entr" presetSubtype="0" fill="hold" grpId="0" nodeType="clickEffect">
-                                  <p:stCondLst>
-                                    <p:cond delay="0"/>
-                                  </p:stCondLst>
-                                  <p:childTnLst>
-                                    <p:set>
-                                      <p:cBhvr>
-                                        <p:cTn id="6" dur="1" fill="hold">
-                                          <p:stCondLst>
-                                            <p:cond delay="0"/>
-                                          </p:stCondLst>
-                                        </p:cTn>
-                                        <p:tgtEl>
-                                          <p:spTgt spid="14">
-                                            <p:txEl>
-                                              <p:pRg st="0" end="0"/>
-                                            </p:txEl>
-                                          </p:spTgt>
-                                        </p:tgtEl>
-                                        <p:attrNameLst>
-                                          <p:attrName>style.visibility</p:attrName>
-                                        </p:attrNameLst>
-                                      </p:cBhvr>
-                                      <p:to>
-                                        <p:strVal val="visible"/>
-                                      </p:to>
-                                    </p:set>
-                                    <p:animEffect transition="in" filter="fade">
-                                      <p:cBhvr>
-                                        <p:cTn id="7" dur="3000"/>
-                                        <p:tgtEl>
-                                          <p:spTgt spid="14">
-                                            <p:txEl>
-                                              <p:pRg st="0" end="0"/>
-                                            </p:txEl>
-                                          </p:spTgt>
-                                        </p:tgtEl>
-                                      </p:cBhvr>
-                                    </p:animEffect>
-                                  </p:childTnLst>
-                                </p:cTn>
-                              </p:par>
-                            </p:childTnLst>
-                          </p:cTn>
-                        </p:par>
-                      </p:childTnLst>
-                    </p:cTn>
-                  </p:par>
-                  <p:par>
-                    <p:cTn id="8" fill="hold">
-                      <p:stCondLst>
-                        <p:cond delay="indefinite"/>
-                      </p:stCondLst>
-                      <p:childTnLst>
-                        <p:par>
-                          <p:cTn id="9" fill="hold">
-                            <p:stCondLst>
-                              <p:cond delay="0"/>
-                            </p:stCondLst>
-                            <p:childTnLst>
-                              <p:par>
-                                <p:cTn id="10" presetID="10" presetClass="entr" presetSubtype="0" fill="hold" grpId="0" nodeType="clickEffect">
-                                  <p:stCondLst>
-                                    <p:cond delay="0"/>
-                                  </p:stCondLst>
-                                  <p:childTnLst>
-                                    <p:set>
-                                      <p:cBhvr>
-                                        <p:cTn id="11" dur="1" fill="hold">
-                                          <p:stCondLst>
-                                            <p:cond delay="0"/>
-                                          </p:stCondLst>
-                                        </p:cTn>
-                                        <p:tgtEl>
-                                          <p:spTgt spid="14">
-                                            <p:txEl>
-                                              <p:pRg st="1" end="1"/>
-                                            </p:txEl>
-                                          </p:spTgt>
-                                        </p:tgtEl>
-                                        <p:attrNameLst>
-                                          <p:attrName>style.visibility</p:attrName>
-                                        </p:attrNameLst>
-                                      </p:cBhvr>
-                                      <p:to>
-                                        <p:strVal val="visible"/>
-                                      </p:to>
-                                    </p:set>
-                                    <p:animEffect transition="in" filter="fade">
-                                      <p:cBhvr>
-                                        <p:cTn id="12" dur="3000"/>
-                                        <p:tgtEl>
-                                          <p:spTgt spid="14">
-                                            <p:txEl>
-                                              <p:pRg st="1" end="1"/>
-                                            </p:txEl>
-                                          </p:spTgt>
-                                        </p:tgtEl>
-                                      </p:cBhvr>
-                                    </p:animEffect>
-                                  </p:childTnLst>
-                                </p:cTn>
-                              </p:par>
-                            </p:childTnLst>
-                          </p:cTn>
-                        </p:par>
-                      </p:childTnLst>
-                    </p:cTn>
-                  </p:par>
-                  <p:par>
-                    <p:cTn id="13" fill="hold">
-                      <p:stCondLst>
-                        <p:cond delay="indefinite"/>
-                      </p:stCondLst>
-                      <p:childTnLst>
-                        <p:par>
-                          <p:cTn id="14" fill="hold">
-                            <p:stCondLst>
-                              <p:cond delay="0"/>
-                            </p:stCondLst>
-                            <p:childTnLst>
-                              <p:par>
-                                <p:cTn id="15" presetID="10" presetClass="entr" presetSubtype="0" fill="hold" grpId="0" nodeType="clickEffect">
-                                  <p:stCondLst>
-                                    <p:cond delay="0"/>
-                                  </p:stCondLst>
-                                  <p:childTnLst>
-                                    <p:set>
-                                      <p:cBhvr>
-                                        <p:cTn id="16" dur="1" fill="hold">
-                                          <p:stCondLst>
-                                            <p:cond delay="0"/>
-                                          </p:stCondLst>
-                                        </p:cTn>
-                                        <p:tgtEl>
-                                          <p:spTgt spid="14">
-                                            <p:txEl>
-                                              <p:pRg st="2" end="2"/>
-                                            </p:txEl>
-                                          </p:spTgt>
-                                        </p:tgtEl>
-                                        <p:attrNameLst>
-                                          <p:attrName>style.visibility</p:attrName>
-                                        </p:attrNameLst>
-                                      </p:cBhvr>
-                                      <p:to>
-                                        <p:strVal val="visible"/>
-                                      </p:to>
-                                    </p:set>
-                                    <p:animEffect transition="in" filter="fade">
-                                      <p:cBhvr>
-                                        <p:cTn id="17" dur="3000"/>
-                                        <p:tgtEl>
-                                          <p:spTgt spid="14">
-                                            <p:txEl>
-                                              <p:pRg st="2" end="2"/>
-                                            </p:txEl>
-                                          </p:spTgt>
-                                        </p:tgtEl>
-                                      </p:cBhvr>
-                                    </p:animEffect>
-                                  </p:childTnLst>
-                                </p:cTn>
-                              </p:par>
-                            </p:childTnLst>
-                          </p:cTn>
-                        </p:par>
-                      </p:childTnLst>
-                    </p:cTn>
-                  </p:par>
-                  <p:par>
-                    <p:cTn id="18" fill="hold">
-                      <p:stCondLst>
-                        <p:cond delay="indefinite"/>
-                      </p:stCondLst>
-                      <p:childTnLst>
-                        <p:par>
-                          <p:cTn id="19" fill="hold">
-                            <p:stCondLst>
-                              <p:cond delay="0"/>
-                            </p:stCondLst>
-                            <p:childTnLst>
-                              <p:par>
-                                <p:cTn id="20" presetID="10" presetClass="entr" presetSubtype="0" fill="hold" grpId="0" nodeType="clickEffect">
-                                  <p:stCondLst>
-                                    <p:cond delay="0"/>
-                                  </p:stCondLst>
-                                  <p:childTnLst>
-                                    <p:set>
-                                      <p:cBhvr>
-                                        <p:cTn id="21" dur="1" fill="hold">
-                                          <p:stCondLst>
-                                            <p:cond delay="0"/>
-                                          </p:stCondLst>
-                                        </p:cTn>
-                                        <p:tgtEl>
-                                          <p:spTgt spid="14">
-                                            <p:txEl>
-                                              <p:pRg st="3" end="3"/>
-                                            </p:txEl>
-                                          </p:spTgt>
-                                        </p:tgtEl>
-                                        <p:attrNameLst>
-                                          <p:attrName>style.visibility</p:attrName>
-                                        </p:attrNameLst>
-                                      </p:cBhvr>
-                                      <p:to>
-                                        <p:strVal val="visible"/>
-                                      </p:to>
-                                    </p:set>
-                                    <p:animEffect transition="in" filter="fade">
-                                      <p:cBhvr>
-                                        <p:cTn id="22" dur="3000"/>
-                                        <p:tgtEl>
-                                          <p:spTgt spid="14">
-                                            <p:txEl>
-                                              <p:pRg st="3" end="3"/>
-                                            </p:txEl>
-                                          </p:spTgt>
-                                        </p:tgtEl>
-                                      </p:cBhvr>
-                                    </p:animEffect>
-                                  </p:childTnLst>
-                                </p:cTn>
-                              </p:par>
-                            </p:childTnLst>
-                          </p:cTn>
-                        </p:par>
-                      </p:childTnLst>
-                    </p:cTn>
-                  </p:par>
-                </p:childTnLst>
-              </p:cTn>
-              <p:prevCondLst>
-                <p:cond evt="onPrev" delay="0">
-                  <p:tgtEl>
-                    <p:sldTgt/>
-                  </p:tgtEl>
-                </p:cond>
-              </p:prevCondLst>
-              <p:nextCondLst>
-                <p:cond evt="onNext" delay="0">
-                  <p:tgtEl>
-                    <p:sldTgt/>
-                  </p:tgtEl>
-                </p:cond>
-              </p:nextCondLst>
-            </p:seq>
-          </p:childTnLst>
-        </p:cTn>
+        <p:cTn id="1" dur="indefinite" restart="never" nodeType="tmRoot"/>
       </p:par>
     </p:tnLst>
-    <p:bldLst>
-      <p:bldP spid="14" grpId="0" build="p"/>
-    </p:bldLst>
   </p:timing>
 </p:sld>
 </file>
@@ -29094,11 +28755,7 @@
             </a:pPr>
             <a:r>
               <a:rPr lang="en-US" dirty="0" smtClean="0"/>
-              <a:t>Click </a:t>
-            </a:r>
-            <a:r>
-              <a:rPr lang="en-US" dirty="0" smtClean="0"/>
-              <a:t>“</a:t>
+              <a:t>Click “</a:t>
             </a:r>
             <a:r>
               <a:rPr lang="en-US" dirty="0" smtClean="0">
@@ -29110,11 +28767,7 @@
             </a:r>
             <a:r>
               <a:rPr lang="en-US" dirty="0" smtClean="0"/>
-              <a:t>” </a:t>
-            </a:r>
-            <a:r>
-              <a:rPr lang="en-US" dirty="0" smtClean="0"/>
-              <a:t>on the navigation bar</a:t>
+              <a:t>” on the navigation bar</a:t>
             </a:r>
             <a:endParaRPr lang="en-US" dirty="0"/>
           </a:p>
@@ -31119,7 +30772,6 @@
               <a:rPr lang="en-US" dirty="0" smtClean="0"/>
               <a:t>To create our first chart, below files need to be modified:</a:t>
             </a:r>
-            <a:endParaRPr lang="en-US" dirty="0" smtClean="0"/>
           </a:p>
         </p:txBody>
       </p:sp>
@@ -31594,7 +31246,6 @@
               <a:rPr lang="en-US" dirty="0" smtClean="0"/>
               <a:t>” contains code to demonstrate above points</a:t>
             </a:r>
-            <a:endParaRPr lang="en-US" dirty="0" smtClean="0"/>
           </a:p>
         </p:txBody>
       </p:sp>
@@ -32828,11 +32479,7 @@
             </a:pPr>
             <a:r>
               <a:rPr lang="en-US" dirty="0" smtClean="0"/>
-              <a:t>Click </a:t>
-            </a:r>
-            <a:r>
-              <a:rPr lang="en-US" dirty="0" smtClean="0"/>
-              <a:t>“</a:t>
+              <a:t>Click “</a:t>
             </a:r>
             <a:r>
               <a:rPr lang="en-US" dirty="0" smtClean="0">
@@ -32844,11 +32491,7 @@
             </a:r>
             <a:r>
               <a:rPr lang="en-US" dirty="0" smtClean="0"/>
-              <a:t>” </a:t>
-            </a:r>
-            <a:r>
-              <a:rPr lang="en-US" dirty="0" smtClean="0"/>
-              <a:t>on the navigation bar</a:t>
+              <a:t>” on the navigation bar</a:t>
             </a:r>
             <a:endParaRPr lang="en-US" dirty="0"/>
           </a:p>
@@ -38025,8 +37668,49 @@
         </p:blipFill>
         <p:spPr bwMode="auto">
           <a:xfrm>
-            <a:off x="5905924" y="2996952"/>
+            <a:off x="1527092" y="2770187"/>
             <a:ext cx="4762500" cy="2381250"/>
+          </a:xfrm>
+          <a:prstGeom prst="rect">
+            <a:avLst/>
+          </a:prstGeom>
+          <a:noFill/>
+          <a:extLst>
+            <a:ext uri="{909E8E84-426E-40DD-AFC4-6F175D3DCCD1}">
+              <a14:hiddenFill xmlns:a14="http://schemas.microsoft.com/office/drawing/2010/main">
+                <a:solidFill>
+                  <a:srgbClr val="FFFFFF"/>
+                </a:solidFill>
+              </a14:hiddenFill>
+            </a:ext>
+          </a:extLst>
+        </p:spPr>
+      </p:pic>
+      <p:pic>
+        <p:nvPicPr>
+          <p:cNvPr id="1026" name="Picture 2" descr="http://m5designstudio.com/wp-content/uploads/2013/04/bootstrap_responsive_layout.png"/>
+          <p:cNvPicPr>
+            <a:picLocks noChangeAspect="1" noChangeArrowheads="1"/>
+          </p:cNvPicPr>
+          <p:nvPr/>
+        </p:nvPicPr>
+        <p:blipFill>
+          <a:blip r:embed="rId4">
+            <a:extLst>
+              <a:ext uri="{28A0092B-C50C-407E-A947-70E740481C1C}">
+                <a14:useLocalDpi xmlns:a14="http://schemas.microsoft.com/office/drawing/2010/main" val="0"/>
+              </a:ext>
+            </a:extLst>
+          </a:blip>
+          <a:srcRect/>
+          <a:stretch>
+            <a:fillRect/>
+          </a:stretch>
+        </p:blipFill>
+        <p:spPr bwMode="auto">
+          <a:xfrm>
+            <a:off x="6708303" y="4361388"/>
+            <a:ext cx="4140225" cy="1734612"/>
           </a:xfrm>
           <a:prstGeom prst="rect">
             <a:avLst/>
@@ -38059,391 +37743,9 @@
   <p:timing>
     <p:tnLst>
       <p:par>
-        <p:cTn id="1" dur="indefinite" restart="never" nodeType="tmRoot">
-          <p:childTnLst>
-            <p:seq concurrent="1" nextAc="seek">
-              <p:cTn id="2" dur="indefinite" nodeType="mainSeq">
-                <p:childTnLst>
-                  <p:par>
-                    <p:cTn id="3" fill="hold">
-                      <p:stCondLst>
-                        <p:cond delay="indefinite"/>
-                      </p:stCondLst>
-                      <p:childTnLst>
-                        <p:par>
-                          <p:cTn id="4" fill="hold">
-                            <p:stCondLst>
-                              <p:cond delay="0"/>
-                            </p:stCondLst>
-                            <p:childTnLst>
-                              <p:par>
-                                <p:cTn id="5" presetID="26" presetClass="entr" presetSubtype="0" fill="hold" grpId="0" nodeType="clickEffect">
-                                  <p:stCondLst>
-                                    <p:cond delay="0"/>
-                                  </p:stCondLst>
-                                  <p:childTnLst>
-                                    <p:set>
-                                      <p:cBhvr>
-                                        <p:cTn id="6" dur="1" fill="hold">
-                                          <p:stCondLst>
-                                            <p:cond delay="0"/>
-                                          </p:stCondLst>
-                                        </p:cTn>
-                                        <p:tgtEl>
-                                          <p:spTgt spid="3">
-                                            <p:txEl>
-                                              <p:pRg st="0" end="0"/>
-                                            </p:txEl>
-                                          </p:spTgt>
-                                        </p:tgtEl>
-                                        <p:attrNameLst>
-                                          <p:attrName>style.visibility</p:attrName>
-                                        </p:attrNameLst>
-                                      </p:cBhvr>
-                                      <p:to>
-                                        <p:strVal val="visible"/>
-                                      </p:to>
-                                    </p:set>
-                                    <p:animEffect transition="in" filter="wipe(down)">
-                                      <p:cBhvr>
-                                        <p:cTn id="7" dur="1160">
-                                          <p:stCondLst>
-                                            <p:cond delay="0"/>
-                                          </p:stCondLst>
-                                        </p:cTn>
-                                        <p:tgtEl>
-                                          <p:spTgt spid="3">
-                                            <p:txEl>
-                                              <p:pRg st="0" end="0"/>
-                                            </p:txEl>
-                                          </p:spTgt>
-                                        </p:tgtEl>
-                                      </p:cBhvr>
-                                    </p:animEffect>
-                                    <p:anim calcmode="lin" valueType="num">
-                                      <p:cBhvr>
-                                        <p:cTn id="8" dur="3644" tmFilter="0,0; 0.14,0.36; 0.43,0.73; 0.71,0.91; 1.0,1.0">
-                                          <p:stCondLst>
-                                            <p:cond delay="0"/>
-                                          </p:stCondLst>
-                                        </p:cTn>
-                                        <p:tgtEl>
-                                          <p:spTgt spid="3">
-                                            <p:txEl>
-                                              <p:pRg st="0" end="0"/>
-                                            </p:txEl>
-                                          </p:spTgt>
-                                        </p:tgtEl>
-                                        <p:attrNameLst>
-                                          <p:attrName>ppt_x</p:attrName>
-                                        </p:attrNameLst>
-                                      </p:cBhvr>
-                                      <p:tavLst>
-                                        <p:tav tm="0">
-                                          <p:val>
-                                            <p:strVal val="#ppt_x-0.25"/>
-                                          </p:val>
-                                        </p:tav>
-                                        <p:tav tm="100000">
-                                          <p:val>
-                                            <p:strVal val="#ppt_x"/>
-                                          </p:val>
-                                        </p:tav>
-                                      </p:tavLst>
-                                    </p:anim>
-                                    <p:anim calcmode="lin" valueType="num">
-                                      <p:cBhvr>
-                                        <p:cTn id="9" dur="1328" tmFilter="0.0,0.0; 0.25,0.07; 0.50,0.2; 0.75,0.467; 1.0,1.0">
-                                          <p:stCondLst>
-                                            <p:cond delay="0"/>
-                                          </p:stCondLst>
-                                        </p:cTn>
-                                        <p:tgtEl>
-                                          <p:spTgt spid="3">
-                                            <p:txEl>
-                                              <p:pRg st="0" end="0"/>
-                                            </p:txEl>
-                                          </p:spTgt>
-                                        </p:tgtEl>
-                                        <p:attrNameLst>
-                                          <p:attrName>ppt_y</p:attrName>
-                                        </p:attrNameLst>
-                                      </p:cBhvr>
-                                      <p:tavLst>
-                                        <p:tav tm="0" fmla="#ppt_y-sin(pi*$)/3">
-                                          <p:val>
-                                            <p:fltVal val="0.5"/>
-                                          </p:val>
-                                        </p:tav>
-                                        <p:tav tm="100000">
-                                          <p:val>
-                                            <p:fltVal val="1"/>
-                                          </p:val>
-                                        </p:tav>
-                                      </p:tavLst>
-                                    </p:anim>
-                                    <p:anim calcmode="lin" valueType="num">
-                                      <p:cBhvr>
-                                        <p:cTn id="10" dur="1328" tmFilter="0, 0; 0.125,0.2665; 0.25,0.4; 0.375,0.465; 0.5,0.5;  0.625,0.535; 0.75,0.6; 0.875,0.7335; 1,1">
-                                          <p:stCondLst>
-                                            <p:cond delay="1328"/>
-                                          </p:stCondLst>
-                                        </p:cTn>
-                                        <p:tgtEl>
-                                          <p:spTgt spid="3">
-                                            <p:txEl>
-                                              <p:pRg st="0" end="0"/>
-                                            </p:txEl>
-                                          </p:spTgt>
-                                        </p:tgtEl>
-                                        <p:attrNameLst>
-                                          <p:attrName>ppt_y</p:attrName>
-                                        </p:attrNameLst>
-                                      </p:cBhvr>
-                                      <p:tavLst>
-                                        <p:tav tm="0" fmla="#ppt_y-sin(pi*$)/9">
-                                          <p:val>
-                                            <p:fltVal val="0"/>
-                                          </p:val>
-                                        </p:tav>
-                                        <p:tav tm="100000">
-                                          <p:val>
-                                            <p:fltVal val="1"/>
-                                          </p:val>
-                                        </p:tav>
-                                      </p:tavLst>
-                                    </p:anim>
-                                    <p:anim calcmode="lin" valueType="num">
-                                      <p:cBhvr>
-                                        <p:cTn id="11" dur="664" tmFilter="0, 0; 0.125,0.2665; 0.25,0.4; 0.375,0.465; 0.5,0.5;  0.625,0.535; 0.75,0.6; 0.875,0.7335; 1,1">
-                                          <p:stCondLst>
-                                            <p:cond delay="2648"/>
-                                          </p:stCondLst>
-                                        </p:cTn>
-                                        <p:tgtEl>
-                                          <p:spTgt spid="3">
-                                            <p:txEl>
-                                              <p:pRg st="0" end="0"/>
-                                            </p:txEl>
-                                          </p:spTgt>
-                                        </p:tgtEl>
-                                        <p:attrNameLst>
-                                          <p:attrName>ppt_y</p:attrName>
-                                        </p:attrNameLst>
-                                      </p:cBhvr>
-                                      <p:tavLst>
-                                        <p:tav tm="0" fmla="#ppt_y-sin(pi*$)/27">
-                                          <p:val>
-                                            <p:fltVal val="0"/>
-                                          </p:val>
-                                        </p:tav>
-                                        <p:tav tm="100000">
-                                          <p:val>
-                                            <p:fltVal val="1"/>
-                                          </p:val>
-                                        </p:tav>
-                                      </p:tavLst>
-                                    </p:anim>
-                                    <p:anim calcmode="lin" valueType="num">
-                                      <p:cBhvr>
-                                        <p:cTn id="12" dur="328" tmFilter="0, 0; 0.125,0.2665; 0.25,0.4; 0.375,0.465; 0.5,0.5;  0.625,0.535; 0.75,0.6; 0.875,0.7335; 1,1">
-                                          <p:stCondLst>
-                                            <p:cond delay="3312"/>
-                                          </p:stCondLst>
-                                        </p:cTn>
-                                        <p:tgtEl>
-                                          <p:spTgt spid="3">
-                                            <p:txEl>
-                                              <p:pRg st="0" end="0"/>
-                                            </p:txEl>
-                                          </p:spTgt>
-                                        </p:tgtEl>
-                                        <p:attrNameLst>
-                                          <p:attrName>ppt_y</p:attrName>
-                                        </p:attrNameLst>
-                                      </p:cBhvr>
-                                      <p:tavLst>
-                                        <p:tav tm="0" fmla="#ppt_y-sin(pi*$)/81">
-                                          <p:val>
-                                            <p:fltVal val="0"/>
-                                          </p:val>
-                                        </p:tav>
-                                        <p:tav tm="100000">
-                                          <p:val>
-                                            <p:fltVal val="1"/>
-                                          </p:val>
-                                        </p:tav>
-                                      </p:tavLst>
-                                    </p:anim>
-                                    <p:animScale>
-                                      <p:cBhvr>
-                                        <p:cTn id="13" dur="52">
-                                          <p:stCondLst>
-                                            <p:cond delay="1300"/>
-                                          </p:stCondLst>
-                                        </p:cTn>
-                                        <p:tgtEl>
-                                          <p:spTgt spid="3">
-                                            <p:txEl>
-                                              <p:pRg st="0" end="0"/>
-                                            </p:txEl>
-                                          </p:spTgt>
-                                        </p:tgtEl>
-                                      </p:cBhvr>
-                                      <p:to x="100000" y="60000"/>
-                                    </p:animScale>
-                                    <p:animScale>
-                                      <p:cBhvr>
-                                        <p:cTn id="14" dur="332" decel="50000">
-                                          <p:stCondLst>
-                                            <p:cond delay="1352"/>
-                                          </p:stCondLst>
-                                        </p:cTn>
-                                        <p:tgtEl>
-                                          <p:spTgt spid="3">
-                                            <p:txEl>
-                                              <p:pRg st="0" end="0"/>
-                                            </p:txEl>
-                                          </p:spTgt>
-                                        </p:tgtEl>
-                                      </p:cBhvr>
-                                      <p:to x="100000" y="100000"/>
-                                    </p:animScale>
-                                    <p:animScale>
-                                      <p:cBhvr>
-                                        <p:cTn id="15" dur="52">
-                                          <p:stCondLst>
-                                            <p:cond delay="2624"/>
-                                          </p:stCondLst>
-                                        </p:cTn>
-                                        <p:tgtEl>
-                                          <p:spTgt spid="3">
-                                            <p:txEl>
-                                              <p:pRg st="0" end="0"/>
-                                            </p:txEl>
-                                          </p:spTgt>
-                                        </p:tgtEl>
-                                      </p:cBhvr>
-                                      <p:to x="100000" y="80000"/>
-                                    </p:animScale>
-                                    <p:animScale>
-                                      <p:cBhvr>
-                                        <p:cTn id="16" dur="332" decel="50000">
-                                          <p:stCondLst>
-                                            <p:cond delay="2676"/>
-                                          </p:stCondLst>
-                                        </p:cTn>
-                                        <p:tgtEl>
-                                          <p:spTgt spid="3">
-                                            <p:txEl>
-                                              <p:pRg st="0" end="0"/>
-                                            </p:txEl>
-                                          </p:spTgt>
-                                        </p:tgtEl>
-                                      </p:cBhvr>
-                                      <p:to x="100000" y="100000"/>
-                                    </p:animScale>
-                                    <p:animScale>
-                                      <p:cBhvr>
-                                        <p:cTn id="17" dur="52">
-                                          <p:stCondLst>
-                                            <p:cond delay="3284"/>
-                                          </p:stCondLst>
-                                        </p:cTn>
-                                        <p:tgtEl>
-                                          <p:spTgt spid="3">
-                                            <p:txEl>
-                                              <p:pRg st="0" end="0"/>
-                                            </p:txEl>
-                                          </p:spTgt>
-                                        </p:tgtEl>
-                                      </p:cBhvr>
-                                      <p:to x="100000" y="90000"/>
-                                    </p:animScale>
-                                    <p:animScale>
-                                      <p:cBhvr>
-                                        <p:cTn id="18" dur="332" decel="50000">
-                                          <p:stCondLst>
-                                            <p:cond delay="3336"/>
-                                          </p:stCondLst>
-                                        </p:cTn>
-                                        <p:tgtEl>
-                                          <p:spTgt spid="3">
-                                            <p:txEl>
-                                              <p:pRg st="0" end="0"/>
-                                            </p:txEl>
-                                          </p:spTgt>
-                                        </p:tgtEl>
-                                      </p:cBhvr>
-                                      <p:to x="100000" y="100000"/>
-                                    </p:animScale>
-                                    <p:animScale>
-                                      <p:cBhvr>
-                                        <p:cTn id="19" dur="52">
-                                          <p:stCondLst>
-                                            <p:cond delay="3616"/>
-                                          </p:stCondLst>
-                                        </p:cTn>
-                                        <p:tgtEl>
-                                          <p:spTgt spid="3">
-                                            <p:txEl>
-                                              <p:pRg st="0" end="0"/>
-                                            </p:txEl>
-                                          </p:spTgt>
-                                        </p:tgtEl>
-                                      </p:cBhvr>
-                                      <p:to x="100000" y="95000"/>
-                                    </p:animScale>
-                                    <p:animScale>
-                                      <p:cBhvr>
-                                        <p:cTn id="20" dur="332" decel="50000">
-                                          <p:stCondLst>
-                                            <p:cond delay="3668"/>
-                                          </p:stCondLst>
-                                        </p:cTn>
-                                        <p:tgtEl>
-                                          <p:spTgt spid="3">
-                                            <p:txEl>
-                                              <p:pRg st="0" end="0"/>
-                                            </p:txEl>
-                                          </p:spTgt>
-                                        </p:tgtEl>
-                                      </p:cBhvr>
-                                      <p:to x="100000" y="100000"/>
-                                    </p:animScale>
-                                  </p:childTnLst>
-                                </p:cTn>
-                              </p:par>
-                            </p:childTnLst>
-                          </p:cTn>
-                        </p:par>
-                      </p:childTnLst>
-                    </p:cTn>
-                  </p:par>
-                </p:childTnLst>
-              </p:cTn>
-              <p:prevCondLst>
-                <p:cond evt="onPrev" delay="0">
-                  <p:tgtEl>
-                    <p:sldTgt/>
-                  </p:tgtEl>
-                </p:cond>
-              </p:prevCondLst>
-              <p:nextCondLst>
-                <p:cond evt="onNext" delay="0">
-                  <p:tgtEl>
-                    <p:sldTgt/>
-                  </p:tgtEl>
-                </p:cond>
-              </p:nextCondLst>
-            </p:seq>
-          </p:childTnLst>
-        </p:cTn>
+        <p:cTn id="1" dur="indefinite" restart="never" nodeType="tmRoot"/>
       </p:par>
     </p:tnLst>
-    <p:bldLst>
-      <p:bldP spid="3" grpId="0" build="p"/>
-    </p:bldLst>
   </p:timing>
 </p:sld>
 </file>
@@ -38592,12 +37894,53 @@
         </p:blipFill>
         <p:spPr>
           <a:xfrm>
-            <a:off x="1703512" y="5441875"/>
-            <a:ext cx="6214183" cy="1308249"/>
+            <a:off x="1703512" y="5698281"/>
+            <a:ext cx="3778326" cy="795437"/>
           </a:xfrm>
           <a:prstGeom prst="rect">
             <a:avLst/>
           </a:prstGeom>
+        </p:spPr>
+      </p:pic>
+      <p:pic>
+        <p:nvPicPr>
+          <p:cNvPr id="2052" name="Picture 4" descr="responsive-templates"/>
+          <p:cNvPicPr>
+            <a:picLocks noChangeAspect="1" noChangeArrowheads="1"/>
+          </p:cNvPicPr>
+          <p:nvPr/>
+        </p:nvPicPr>
+        <p:blipFill>
+          <a:blip r:embed="rId4">
+            <a:extLst>
+              <a:ext uri="{28A0092B-C50C-407E-A947-70E740481C1C}">
+                <a14:useLocalDpi xmlns:a14="http://schemas.microsoft.com/office/drawing/2010/main" val="0"/>
+              </a:ext>
+            </a:extLst>
+          </a:blip>
+          <a:srcRect/>
+          <a:stretch>
+            <a:fillRect/>
+          </a:stretch>
+        </p:blipFill>
+        <p:spPr bwMode="auto">
+          <a:xfrm>
+            <a:off x="6345607" y="5402830"/>
+            <a:ext cx="4690817" cy="1090888"/>
+          </a:xfrm>
+          <a:prstGeom prst="rect">
+            <a:avLst/>
+          </a:prstGeom>
+          <a:noFill/>
+          <a:extLst>
+            <a:ext uri="{909E8E84-426E-40DD-AFC4-6F175D3DCCD1}">
+              <a14:hiddenFill xmlns:a14="http://schemas.microsoft.com/office/drawing/2010/main">
+                <a:solidFill>
+                  <a:srgbClr val="FFFFFF"/>
+                </a:solidFill>
+              </a14:hiddenFill>
+            </a:ext>
+          </a:extLst>
         </p:spPr>
       </p:pic>
     </p:spTree>
@@ -38616,1459 +37959,9 @@
   <p:timing>
     <p:tnLst>
       <p:par>
-        <p:cTn id="1" dur="indefinite" restart="never" nodeType="tmRoot">
-          <p:childTnLst>
-            <p:seq concurrent="1" nextAc="seek">
-              <p:cTn id="2" dur="indefinite" nodeType="mainSeq">
-                <p:childTnLst>
-                  <p:par>
-                    <p:cTn id="3" fill="hold">
-                      <p:stCondLst>
-                        <p:cond delay="indefinite"/>
-                      </p:stCondLst>
-                      <p:childTnLst>
-                        <p:par>
-                          <p:cTn id="4" fill="hold">
-                            <p:stCondLst>
-                              <p:cond delay="0"/>
-                            </p:stCondLst>
-                            <p:childTnLst>
-                              <p:par>
-                                <p:cTn id="5" presetID="26" presetClass="entr" presetSubtype="0" fill="hold" grpId="0" nodeType="clickEffect">
-                                  <p:stCondLst>
-                                    <p:cond delay="0"/>
-                                  </p:stCondLst>
-                                  <p:childTnLst>
-                                    <p:set>
-                                      <p:cBhvr>
-                                        <p:cTn id="6" dur="1" fill="hold">
-                                          <p:stCondLst>
-                                            <p:cond delay="0"/>
-                                          </p:stCondLst>
-                                        </p:cTn>
-                                        <p:tgtEl>
-                                          <p:spTgt spid="3">
-                                            <p:txEl>
-                                              <p:pRg st="0" end="0"/>
-                                            </p:txEl>
-                                          </p:spTgt>
-                                        </p:tgtEl>
-                                        <p:attrNameLst>
-                                          <p:attrName>style.visibility</p:attrName>
-                                        </p:attrNameLst>
-                                      </p:cBhvr>
-                                      <p:to>
-                                        <p:strVal val="visible"/>
-                                      </p:to>
-                                    </p:set>
-                                    <p:animEffect transition="in" filter="wipe(down)">
-                                      <p:cBhvr>
-                                        <p:cTn id="7" dur="1160">
-                                          <p:stCondLst>
-                                            <p:cond delay="0"/>
-                                          </p:stCondLst>
-                                        </p:cTn>
-                                        <p:tgtEl>
-                                          <p:spTgt spid="3">
-                                            <p:txEl>
-                                              <p:pRg st="0" end="0"/>
-                                            </p:txEl>
-                                          </p:spTgt>
-                                        </p:tgtEl>
-                                      </p:cBhvr>
-                                    </p:animEffect>
-                                    <p:anim calcmode="lin" valueType="num">
-                                      <p:cBhvr>
-                                        <p:cTn id="8" dur="3644" tmFilter="0,0; 0.14,0.36; 0.43,0.73; 0.71,0.91; 1.0,1.0">
-                                          <p:stCondLst>
-                                            <p:cond delay="0"/>
-                                          </p:stCondLst>
-                                        </p:cTn>
-                                        <p:tgtEl>
-                                          <p:spTgt spid="3">
-                                            <p:txEl>
-                                              <p:pRg st="0" end="0"/>
-                                            </p:txEl>
-                                          </p:spTgt>
-                                        </p:tgtEl>
-                                        <p:attrNameLst>
-                                          <p:attrName>ppt_x</p:attrName>
-                                        </p:attrNameLst>
-                                      </p:cBhvr>
-                                      <p:tavLst>
-                                        <p:tav tm="0">
-                                          <p:val>
-                                            <p:strVal val="#ppt_x-0.25"/>
-                                          </p:val>
-                                        </p:tav>
-                                        <p:tav tm="100000">
-                                          <p:val>
-                                            <p:strVal val="#ppt_x"/>
-                                          </p:val>
-                                        </p:tav>
-                                      </p:tavLst>
-                                    </p:anim>
-                                    <p:anim calcmode="lin" valueType="num">
-                                      <p:cBhvr>
-                                        <p:cTn id="9" dur="1328" tmFilter="0.0,0.0; 0.25,0.07; 0.50,0.2; 0.75,0.467; 1.0,1.0">
-                                          <p:stCondLst>
-                                            <p:cond delay="0"/>
-                                          </p:stCondLst>
-                                        </p:cTn>
-                                        <p:tgtEl>
-                                          <p:spTgt spid="3">
-                                            <p:txEl>
-                                              <p:pRg st="0" end="0"/>
-                                            </p:txEl>
-                                          </p:spTgt>
-                                        </p:tgtEl>
-                                        <p:attrNameLst>
-                                          <p:attrName>ppt_y</p:attrName>
-                                        </p:attrNameLst>
-                                      </p:cBhvr>
-                                      <p:tavLst>
-                                        <p:tav tm="0" fmla="#ppt_y-sin(pi*$)/3">
-                                          <p:val>
-                                            <p:fltVal val="0.5"/>
-                                          </p:val>
-                                        </p:tav>
-                                        <p:tav tm="100000">
-                                          <p:val>
-                                            <p:fltVal val="1"/>
-                                          </p:val>
-                                        </p:tav>
-                                      </p:tavLst>
-                                    </p:anim>
-                                    <p:anim calcmode="lin" valueType="num">
-                                      <p:cBhvr>
-                                        <p:cTn id="10" dur="1328" tmFilter="0, 0; 0.125,0.2665; 0.25,0.4; 0.375,0.465; 0.5,0.5;  0.625,0.535; 0.75,0.6; 0.875,0.7335; 1,1">
-                                          <p:stCondLst>
-                                            <p:cond delay="1328"/>
-                                          </p:stCondLst>
-                                        </p:cTn>
-                                        <p:tgtEl>
-                                          <p:spTgt spid="3">
-                                            <p:txEl>
-                                              <p:pRg st="0" end="0"/>
-                                            </p:txEl>
-                                          </p:spTgt>
-                                        </p:tgtEl>
-                                        <p:attrNameLst>
-                                          <p:attrName>ppt_y</p:attrName>
-                                        </p:attrNameLst>
-                                      </p:cBhvr>
-                                      <p:tavLst>
-                                        <p:tav tm="0" fmla="#ppt_y-sin(pi*$)/9">
-                                          <p:val>
-                                            <p:fltVal val="0"/>
-                                          </p:val>
-                                        </p:tav>
-                                        <p:tav tm="100000">
-                                          <p:val>
-                                            <p:fltVal val="1"/>
-                                          </p:val>
-                                        </p:tav>
-                                      </p:tavLst>
-                                    </p:anim>
-                                    <p:anim calcmode="lin" valueType="num">
-                                      <p:cBhvr>
-                                        <p:cTn id="11" dur="664" tmFilter="0, 0; 0.125,0.2665; 0.25,0.4; 0.375,0.465; 0.5,0.5;  0.625,0.535; 0.75,0.6; 0.875,0.7335; 1,1">
-                                          <p:stCondLst>
-                                            <p:cond delay="2648"/>
-                                          </p:stCondLst>
-                                        </p:cTn>
-                                        <p:tgtEl>
-                                          <p:spTgt spid="3">
-                                            <p:txEl>
-                                              <p:pRg st="0" end="0"/>
-                                            </p:txEl>
-                                          </p:spTgt>
-                                        </p:tgtEl>
-                                        <p:attrNameLst>
-                                          <p:attrName>ppt_y</p:attrName>
-                                        </p:attrNameLst>
-                                      </p:cBhvr>
-                                      <p:tavLst>
-                                        <p:tav tm="0" fmla="#ppt_y-sin(pi*$)/27">
-                                          <p:val>
-                                            <p:fltVal val="0"/>
-                                          </p:val>
-                                        </p:tav>
-                                        <p:tav tm="100000">
-                                          <p:val>
-                                            <p:fltVal val="1"/>
-                                          </p:val>
-                                        </p:tav>
-                                      </p:tavLst>
-                                    </p:anim>
-                                    <p:anim calcmode="lin" valueType="num">
-                                      <p:cBhvr>
-                                        <p:cTn id="12" dur="328" tmFilter="0, 0; 0.125,0.2665; 0.25,0.4; 0.375,0.465; 0.5,0.5;  0.625,0.535; 0.75,0.6; 0.875,0.7335; 1,1">
-                                          <p:stCondLst>
-                                            <p:cond delay="3312"/>
-                                          </p:stCondLst>
-                                        </p:cTn>
-                                        <p:tgtEl>
-                                          <p:spTgt spid="3">
-                                            <p:txEl>
-                                              <p:pRg st="0" end="0"/>
-                                            </p:txEl>
-                                          </p:spTgt>
-                                        </p:tgtEl>
-                                        <p:attrNameLst>
-                                          <p:attrName>ppt_y</p:attrName>
-                                        </p:attrNameLst>
-                                      </p:cBhvr>
-                                      <p:tavLst>
-                                        <p:tav tm="0" fmla="#ppt_y-sin(pi*$)/81">
-                                          <p:val>
-                                            <p:fltVal val="0"/>
-                                          </p:val>
-                                        </p:tav>
-                                        <p:tav tm="100000">
-                                          <p:val>
-                                            <p:fltVal val="1"/>
-                                          </p:val>
-                                        </p:tav>
-                                      </p:tavLst>
-                                    </p:anim>
-                                    <p:animScale>
-                                      <p:cBhvr>
-                                        <p:cTn id="13" dur="52">
-                                          <p:stCondLst>
-                                            <p:cond delay="1300"/>
-                                          </p:stCondLst>
-                                        </p:cTn>
-                                        <p:tgtEl>
-                                          <p:spTgt spid="3">
-                                            <p:txEl>
-                                              <p:pRg st="0" end="0"/>
-                                            </p:txEl>
-                                          </p:spTgt>
-                                        </p:tgtEl>
-                                      </p:cBhvr>
-                                      <p:to x="100000" y="60000"/>
-                                    </p:animScale>
-                                    <p:animScale>
-                                      <p:cBhvr>
-                                        <p:cTn id="14" dur="332" decel="50000">
-                                          <p:stCondLst>
-                                            <p:cond delay="1352"/>
-                                          </p:stCondLst>
-                                        </p:cTn>
-                                        <p:tgtEl>
-                                          <p:spTgt spid="3">
-                                            <p:txEl>
-                                              <p:pRg st="0" end="0"/>
-                                            </p:txEl>
-                                          </p:spTgt>
-                                        </p:tgtEl>
-                                      </p:cBhvr>
-                                      <p:to x="100000" y="100000"/>
-                                    </p:animScale>
-                                    <p:animScale>
-                                      <p:cBhvr>
-                                        <p:cTn id="15" dur="52">
-                                          <p:stCondLst>
-                                            <p:cond delay="2624"/>
-                                          </p:stCondLst>
-                                        </p:cTn>
-                                        <p:tgtEl>
-                                          <p:spTgt spid="3">
-                                            <p:txEl>
-                                              <p:pRg st="0" end="0"/>
-                                            </p:txEl>
-                                          </p:spTgt>
-                                        </p:tgtEl>
-                                      </p:cBhvr>
-                                      <p:to x="100000" y="80000"/>
-                                    </p:animScale>
-                                    <p:animScale>
-                                      <p:cBhvr>
-                                        <p:cTn id="16" dur="332" decel="50000">
-                                          <p:stCondLst>
-                                            <p:cond delay="2676"/>
-                                          </p:stCondLst>
-                                        </p:cTn>
-                                        <p:tgtEl>
-                                          <p:spTgt spid="3">
-                                            <p:txEl>
-                                              <p:pRg st="0" end="0"/>
-                                            </p:txEl>
-                                          </p:spTgt>
-                                        </p:tgtEl>
-                                      </p:cBhvr>
-                                      <p:to x="100000" y="100000"/>
-                                    </p:animScale>
-                                    <p:animScale>
-                                      <p:cBhvr>
-                                        <p:cTn id="17" dur="52">
-                                          <p:stCondLst>
-                                            <p:cond delay="3284"/>
-                                          </p:stCondLst>
-                                        </p:cTn>
-                                        <p:tgtEl>
-                                          <p:spTgt spid="3">
-                                            <p:txEl>
-                                              <p:pRg st="0" end="0"/>
-                                            </p:txEl>
-                                          </p:spTgt>
-                                        </p:tgtEl>
-                                      </p:cBhvr>
-                                      <p:to x="100000" y="90000"/>
-                                    </p:animScale>
-                                    <p:animScale>
-                                      <p:cBhvr>
-                                        <p:cTn id="18" dur="332" decel="50000">
-                                          <p:stCondLst>
-                                            <p:cond delay="3336"/>
-                                          </p:stCondLst>
-                                        </p:cTn>
-                                        <p:tgtEl>
-                                          <p:spTgt spid="3">
-                                            <p:txEl>
-                                              <p:pRg st="0" end="0"/>
-                                            </p:txEl>
-                                          </p:spTgt>
-                                        </p:tgtEl>
-                                      </p:cBhvr>
-                                      <p:to x="100000" y="100000"/>
-                                    </p:animScale>
-                                    <p:animScale>
-                                      <p:cBhvr>
-                                        <p:cTn id="19" dur="52">
-                                          <p:stCondLst>
-                                            <p:cond delay="3616"/>
-                                          </p:stCondLst>
-                                        </p:cTn>
-                                        <p:tgtEl>
-                                          <p:spTgt spid="3">
-                                            <p:txEl>
-                                              <p:pRg st="0" end="0"/>
-                                            </p:txEl>
-                                          </p:spTgt>
-                                        </p:tgtEl>
-                                      </p:cBhvr>
-                                      <p:to x="100000" y="95000"/>
-                                    </p:animScale>
-                                    <p:animScale>
-                                      <p:cBhvr>
-                                        <p:cTn id="20" dur="332" decel="50000">
-                                          <p:stCondLst>
-                                            <p:cond delay="3668"/>
-                                          </p:stCondLst>
-                                        </p:cTn>
-                                        <p:tgtEl>
-                                          <p:spTgt spid="3">
-                                            <p:txEl>
-                                              <p:pRg st="0" end="0"/>
-                                            </p:txEl>
-                                          </p:spTgt>
-                                        </p:tgtEl>
-                                      </p:cBhvr>
-                                      <p:to x="100000" y="100000"/>
-                                    </p:animScale>
-                                  </p:childTnLst>
-                                </p:cTn>
-                              </p:par>
-                            </p:childTnLst>
-                          </p:cTn>
-                        </p:par>
-                      </p:childTnLst>
-                    </p:cTn>
-                  </p:par>
-                  <p:par>
-                    <p:cTn id="21" fill="hold">
-                      <p:stCondLst>
-                        <p:cond delay="indefinite"/>
-                      </p:stCondLst>
-                      <p:childTnLst>
-                        <p:par>
-                          <p:cTn id="22" fill="hold">
-                            <p:stCondLst>
-                              <p:cond delay="0"/>
-                            </p:stCondLst>
-                            <p:childTnLst>
-                              <p:par>
-                                <p:cTn id="23" presetID="26" presetClass="entr" presetSubtype="0" fill="hold" grpId="0" nodeType="clickEffect">
-                                  <p:stCondLst>
-                                    <p:cond delay="0"/>
-                                  </p:stCondLst>
-                                  <p:childTnLst>
-                                    <p:set>
-                                      <p:cBhvr>
-                                        <p:cTn id="24" dur="1" fill="hold">
-                                          <p:stCondLst>
-                                            <p:cond delay="0"/>
-                                          </p:stCondLst>
-                                        </p:cTn>
-                                        <p:tgtEl>
-                                          <p:spTgt spid="3">
-                                            <p:txEl>
-                                              <p:pRg st="1" end="1"/>
-                                            </p:txEl>
-                                          </p:spTgt>
-                                        </p:tgtEl>
-                                        <p:attrNameLst>
-                                          <p:attrName>style.visibility</p:attrName>
-                                        </p:attrNameLst>
-                                      </p:cBhvr>
-                                      <p:to>
-                                        <p:strVal val="visible"/>
-                                      </p:to>
-                                    </p:set>
-                                    <p:animEffect transition="in" filter="wipe(down)">
-                                      <p:cBhvr>
-                                        <p:cTn id="25" dur="1160">
-                                          <p:stCondLst>
-                                            <p:cond delay="0"/>
-                                          </p:stCondLst>
-                                        </p:cTn>
-                                        <p:tgtEl>
-                                          <p:spTgt spid="3">
-                                            <p:txEl>
-                                              <p:pRg st="1" end="1"/>
-                                            </p:txEl>
-                                          </p:spTgt>
-                                        </p:tgtEl>
-                                      </p:cBhvr>
-                                    </p:animEffect>
-                                    <p:anim calcmode="lin" valueType="num">
-                                      <p:cBhvr>
-                                        <p:cTn id="26" dur="3644" tmFilter="0,0; 0.14,0.36; 0.43,0.73; 0.71,0.91; 1.0,1.0">
-                                          <p:stCondLst>
-                                            <p:cond delay="0"/>
-                                          </p:stCondLst>
-                                        </p:cTn>
-                                        <p:tgtEl>
-                                          <p:spTgt spid="3">
-                                            <p:txEl>
-                                              <p:pRg st="1" end="1"/>
-                                            </p:txEl>
-                                          </p:spTgt>
-                                        </p:tgtEl>
-                                        <p:attrNameLst>
-                                          <p:attrName>ppt_x</p:attrName>
-                                        </p:attrNameLst>
-                                      </p:cBhvr>
-                                      <p:tavLst>
-                                        <p:tav tm="0">
-                                          <p:val>
-                                            <p:strVal val="#ppt_x-0.25"/>
-                                          </p:val>
-                                        </p:tav>
-                                        <p:tav tm="100000">
-                                          <p:val>
-                                            <p:strVal val="#ppt_x"/>
-                                          </p:val>
-                                        </p:tav>
-                                      </p:tavLst>
-                                    </p:anim>
-                                    <p:anim calcmode="lin" valueType="num">
-                                      <p:cBhvr>
-                                        <p:cTn id="27" dur="1328" tmFilter="0.0,0.0; 0.25,0.07; 0.50,0.2; 0.75,0.467; 1.0,1.0">
-                                          <p:stCondLst>
-                                            <p:cond delay="0"/>
-                                          </p:stCondLst>
-                                        </p:cTn>
-                                        <p:tgtEl>
-                                          <p:spTgt spid="3">
-                                            <p:txEl>
-                                              <p:pRg st="1" end="1"/>
-                                            </p:txEl>
-                                          </p:spTgt>
-                                        </p:tgtEl>
-                                        <p:attrNameLst>
-                                          <p:attrName>ppt_y</p:attrName>
-                                        </p:attrNameLst>
-                                      </p:cBhvr>
-                                      <p:tavLst>
-                                        <p:tav tm="0" fmla="#ppt_y-sin(pi*$)/3">
-                                          <p:val>
-                                            <p:fltVal val="0.5"/>
-                                          </p:val>
-                                        </p:tav>
-                                        <p:tav tm="100000">
-                                          <p:val>
-                                            <p:fltVal val="1"/>
-                                          </p:val>
-                                        </p:tav>
-                                      </p:tavLst>
-                                    </p:anim>
-                                    <p:anim calcmode="lin" valueType="num">
-                                      <p:cBhvr>
-                                        <p:cTn id="28" dur="1328" tmFilter="0, 0; 0.125,0.2665; 0.25,0.4; 0.375,0.465; 0.5,0.5;  0.625,0.535; 0.75,0.6; 0.875,0.7335; 1,1">
-                                          <p:stCondLst>
-                                            <p:cond delay="1328"/>
-                                          </p:stCondLst>
-                                        </p:cTn>
-                                        <p:tgtEl>
-                                          <p:spTgt spid="3">
-                                            <p:txEl>
-                                              <p:pRg st="1" end="1"/>
-                                            </p:txEl>
-                                          </p:spTgt>
-                                        </p:tgtEl>
-                                        <p:attrNameLst>
-                                          <p:attrName>ppt_y</p:attrName>
-                                        </p:attrNameLst>
-                                      </p:cBhvr>
-                                      <p:tavLst>
-                                        <p:tav tm="0" fmla="#ppt_y-sin(pi*$)/9">
-                                          <p:val>
-                                            <p:fltVal val="0"/>
-                                          </p:val>
-                                        </p:tav>
-                                        <p:tav tm="100000">
-                                          <p:val>
-                                            <p:fltVal val="1"/>
-                                          </p:val>
-                                        </p:tav>
-                                      </p:tavLst>
-                                    </p:anim>
-                                    <p:anim calcmode="lin" valueType="num">
-                                      <p:cBhvr>
-                                        <p:cTn id="29" dur="664" tmFilter="0, 0; 0.125,0.2665; 0.25,0.4; 0.375,0.465; 0.5,0.5;  0.625,0.535; 0.75,0.6; 0.875,0.7335; 1,1">
-                                          <p:stCondLst>
-                                            <p:cond delay="2648"/>
-                                          </p:stCondLst>
-                                        </p:cTn>
-                                        <p:tgtEl>
-                                          <p:spTgt spid="3">
-                                            <p:txEl>
-                                              <p:pRg st="1" end="1"/>
-                                            </p:txEl>
-                                          </p:spTgt>
-                                        </p:tgtEl>
-                                        <p:attrNameLst>
-                                          <p:attrName>ppt_y</p:attrName>
-                                        </p:attrNameLst>
-                                      </p:cBhvr>
-                                      <p:tavLst>
-                                        <p:tav tm="0" fmla="#ppt_y-sin(pi*$)/27">
-                                          <p:val>
-                                            <p:fltVal val="0"/>
-                                          </p:val>
-                                        </p:tav>
-                                        <p:tav tm="100000">
-                                          <p:val>
-                                            <p:fltVal val="1"/>
-                                          </p:val>
-                                        </p:tav>
-                                      </p:tavLst>
-                                    </p:anim>
-                                    <p:anim calcmode="lin" valueType="num">
-                                      <p:cBhvr>
-                                        <p:cTn id="30" dur="328" tmFilter="0, 0; 0.125,0.2665; 0.25,0.4; 0.375,0.465; 0.5,0.5;  0.625,0.535; 0.75,0.6; 0.875,0.7335; 1,1">
-                                          <p:stCondLst>
-                                            <p:cond delay="3312"/>
-                                          </p:stCondLst>
-                                        </p:cTn>
-                                        <p:tgtEl>
-                                          <p:spTgt spid="3">
-                                            <p:txEl>
-                                              <p:pRg st="1" end="1"/>
-                                            </p:txEl>
-                                          </p:spTgt>
-                                        </p:tgtEl>
-                                        <p:attrNameLst>
-                                          <p:attrName>ppt_y</p:attrName>
-                                        </p:attrNameLst>
-                                      </p:cBhvr>
-                                      <p:tavLst>
-                                        <p:tav tm="0" fmla="#ppt_y-sin(pi*$)/81">
-                                          <p:val>
-                                            <p:fltVal val="0"/>
-                                          </p:val>
-                                        </p:tav>
-                                        <p:tav tm="100000">
-                                          <p:val>
-                                            <p:fltVal val="1"/>
-                                          </p:val>
-                                        </p:tav>
-                                      </p:tavLst>
-                                    </p:anim>
-                                    <p:animScale>
-                                      <p:cBhvr>
-                                        <p:cTn id="31" dur="52">
-                                          <p:stCondLst>
-                                            <p:cond delay="1300"/>
-                                          </p:stCondLst>
-                                        </p:cTn>
-                                        <p:tgtEl>
-                                          <p:spTgt spid="3">
-                                            <p:txEl>
-                                              <p:pRg st="1" end="1"/>
-                                            </p:txEl>
-                                          </p:spTgt>
-                                        </p:tgtEl>
-                                      </p:cBhvr>
-                                      <p:to x="100000" y="60000"/>
-                                    </p:animScale>
-                                    <p:animScale>
-                                      <p:cBhvr>
-                                        <p:cTn id="32" dur="332" decel="50000">
-                                          <p:stCondLst>
-                                            <p:cond delay="1352"/>
-                                          </p:stCondLst>
-                                        </p:cTn>
-                                        <p:tgtEl>
-                                          <p:spTgt spid="3">
-                                            <p:txEl>
-                                              <p:pRg st="1" end="1"/>
-                                            </p:txEl>
-                                          </p:spTgt>
-                                        </p:tgtEl>
-                                      </p:cBhvr>
-                                      <p:to x="100000" y="100000"/>
-                                    </p:animScale>
-                                    <p:animScale>
-                                      <p:cBhvr>
-                                        <p:cTn id="33" dur="52">
-                                          <p:stCondLst>
-                                            <p:cond delay="2624"/>
-                                          </p:stCondLst>
-                                        </p:cTn>
-                                        <p:tgtEl>
-                                          <p:spTgt spid="3">
-                                            <p:txEl>
-                                              <p:pRg st="1" end="1"/>
-                                            </p:txEl>
-                                          </p:spTgt>
-                                        </p:tgtEl>
-                                      </p:cBhvr>
-                                      <p:to x="100000" y="80000"/>
-                                    </p:animScale>
-                                    <p:animScale>
-                                      <p:cBhvr>
-                                        <p:cTn id="34" dur="332" decel="50000">
-                                          <p:stCondLst>
-                                            <p:cond delay="2676"/>
-                                          </p:stCondLst>
-                                        </p:cTn>
-                                        <p:tgtEl>
-                                          <p:spTgt spid="3">
-                                            <p:txEl>
-                                              <p:pRg st="1" end="1"/>
-                                            </p:txEl>
-                                          </p:spTgt>
-                                        </p:tgtEl>
-                                      </p:cBhvr>
-                                      <p:to x="100000" y="100000"/>
-                                    </p:animScale>
-                                    <p:animScale>
-                                      <p:cBhvr>
-                                        <p:cTn id="35" dur="52">
-                                          <p:stCondLst>
-                                            <p:cond delay="3284"/>
-                                          </p:stCondLst>
-                                        </p:cTn>
-                                        <p:tgtEl>
-                                          <p:spTgt spid="3">
-                                            <p:txEl>
-                                              <p:pRg st="1" end="1"/>
-                                            </p:txEl>
-                                          </p:spTgt>
-                                        </p:tgtEl>
-                                      </p:cBhvr>
-                                      <p:to x="100000" y="90000"/>
-                                    </p:animScale>
-                                    <p:animScale>
-                                      <p:cBhvr>
-                                        <p:cTn id="36" dur="332" decel="50000">
-                                          <p:stCondLst>
-                                            <p:cond delay="3336"/>
-                                          </p:stCondLst>
-                                        </p:cTn>
-                                        <p:tgtEl>
-                                          <p:spTgt spid="3">
-                                            <p:txEl>
-                                              <p:pRg st="1" end="1"/>
-                                            </p:txEl>
-                                          </p:spTgt>
-                                        </p:tgtEl>
-                                      </p:cBhvr>
-                                      <p:to x="100000" y="100000"/>
-                                    </p:animScale>
-                                    <p:animScale>
-                                      <p:cBhvr>
-                                        <p:cTn id="37" dur="52">
-                                          <p:stCondLst>
-                                            <p:cond delay="3616"/>
-                                          </p:stCondLst>
-                                        </p:cTn>
-                                        <p:tgtEl>
-                                          <p:spTgt spid="3">
-                                            <p:txEl>
-                                              <p:pRg st="1" end="1"/>
-                                            </p:txEl>
-                                          </p:spTgt>
-                                        </p:tgtEl>
-                                      </p:cBhvr>
-                                      <p:to x="100000" y="95000"/>
-                                    </p:animScale>
-                                    <p:animScale>
-                                      <p:cBhvr>
-                                        <p:cTn id="38" dur="332" decel="50000">
-                                          <p:stCondLst>
-                                            <p:cond delay="3668"/>
-                                          </p:stCondLst>
-                                        </p:cTn>
-                                        <p:tgtEl>
-                                          <p:spTgt spid="3">
-                                            <p:txEl>
-                                              <p:pRg st="1" end="1"/>
-                                            </p:txEl>
-                                          </p:spTgt>
-                                        </p:tgtEl>
-                                      </p:cBhvr>
-                                      <p:to x="100000" y="100000"/>
-                                    </p:animScale>
-                                  </p:childTnLst>
-                                </p:cTn>
-                              </p:par>
-                            </p:childTnLst>
-                          </p:cTn>
-                        </p:par>
-                      </p:childTnLst>
-                    </p:cTn>
-                  </p:par>
-                  <p:par>
-                    <p:cTn id="39" fill="hold">
-                      <p:stCondLst>
-                        <p:cond delay="indefinite"/>
-                      </p:stCondLst>
-                      <p:childTnLst>
-                        <p:par>
-                          <p:cTn id="40" fill="hold">
-                            <p:stCondLst>
-                              <p:cond delay="0"/>
-                            </p:stCondLst>
-                            <p:childTnLst>
-                              <p:par>
-                                <p:cTn id="41" presetID="26" presetClass="entr" presetSubtype="0" fill="hold" grpId="0" nodeType="clickEffect">
-                                  <p:stCondLst>
-                                    <p:cond delay="0"/>
-                                  </p:stCondLst>
-                                  <p:childTnLst>
-                                    <p:set>
-                                      <p:cBhvr>
-                                        <p:cTn id="42" dur="1" fill="hold">
-                                          <p:stCondLst>
-                                            <p:cond delay="0"/>
-                                          </p:stCondLst>
-                                        </p:cTn>
-                                        <p:tgtEl>
-                                          <p:spTgt spid="3">
-                                            <p:txEl>
-                                              <p:pRg st="2" end="2"/>
-                                            </p:txEl>
-                                          </p:spTgt>
-                                        </p:tgtEl>
-                                        <p:attrNameLst>
-                                          <p:attrName>style.visibility</p:attrName>
-                                        </p:attrNameLst>
-                                      </p:cBhvr>
-                                      <p:to>
-                                        <p:strVal val="visible"/>
-                                      </p:to>
-                                    </p:set>
-                                    <p:animEffect transition="in" filter="wipe(down)">
-                                      <p:cBhvr>
-                                        <p:cTn id="43" dur="1160">
-                                          <p:stCondLst>
-                                            <p:cond delay="0"/>
-                                          </p:stCondLst>
-                                        </p:cTn>
-                                        <p:tgtEl>
-                                          <p:spTgt spid="3">
-                                            <p:txEl>
-                                              <p:pRg st="2" end="2"/>
-                                            </p:txEl>
-                                          </p:spTgt>
-                                        </p:tgtEl>
-                                      </p:cBhvr>
-                                    </p:animEffect>
-                                    <p:anim calcmode="lin" valueType="num">
-                                      <p:cBhvr>
-                                        <p:cTn id="44" dur="3644" tmFilter="0,0; 0.14,0.36; 0.43,0.73; 0.71,0.91; 1.0,1.0">
-                                          <p:stCondLst>
-                                            <p:cond delay="0"/>
-                                          </p:stCondLst>
-                                        </p:cTn>
-                                        <p:tgtEl>
-                                          <p:spTgt spid="3">
-                                            <p:txEl>
-                                              <p:pRg st="2" end="2"/>
-                                            </p:txEl>
-                                          </p:spTgt>
-                                        </p:tgtEl>
-                                        <p:attrNameLst>
-                                          <p:attrName>ppt_x</p:attrName>
-                                        </p:attrNameLst>
-                                      </p:cBhvr>
-                                      <p:tavLst>
-                                        <p:tav tm="0">
-                                          <p:val>
-                                            <p:strVal val="#ppt_x-0.25"/>
-                                          </p:val>
-                                        </p:tav>
-                                        <p:tav tm="100000">
-                                          <p:val>
-                                            <p:strVal val="#ppt_x"/>
-                                          </p:val>
-                                        </p:tav>
-                                      </p:tavLst>
-                                    </p:anim>
-                                    <p:anim calcmode="lin" valueType="num">
-                                      <p:cBhvr>
-                                        <p:cTn id="45" dur="1328" tmFilter="0.0,0.0; 0.25,0.07; 0.50,0.2; 0.75,0.467; 1.0,1.0">
-                                          <p:stCondLst>
-                                            <p:cond delay="0"/>
-                                          </p:stCondLst>
-                                        </p:cTn>
-                                        <p:tgtEl>
-                                          <p:spTgt spid="3">
-                                            <p:txEl>
-                                              <p:pRg st="2" end="2"/>
-                                            </p:txEl>
-                                          </p:spTgt>
-                                        </p:tgtEl>
-                                        <p:attrNameLst>
-                                          <p:attrName>ppt_y</p:attrName>
-                                        </p:attrNameLst>
-                                      </p:cBhvr>
-                                      <p:tavLst>
-                                        <p:tav tm="0" fmla="#ppt_y-sin(pi*$)/3">
-                                          <p:val>
-                                            <p:fltVal val="0.5"/>
-                                          </p:val>
-                                        </p:tav>
-                                        <p:tav tm="100000">
-                                          <p:val>
-                                            <p:fltVal val="1"/>
-                                          </p:val>
-                                        </p:tav>
-                                      </p:tavLst>
-                                    </p:anim>
-                                    <p:anim calcmode="lin" valueType="num">
-                                      <p:cBhvr>
-                                        <p:cTn id="46" dur="1328" tmFilter="0, 0; 0.125,0.2665; 0.25,0.4; 0.375,0.465; 0.5,0.5;  0.625,0.535; 0.75,0.6; 0.875,0.7335; 1,1">
-                                          <p:stCondLst>
-                                            <p:cond delay="1328"/>
-                                          </p:stCondLst>
-                                        </p:cTn>
-                                        <p:tgtEl>
-                                          <p:spTgt spid="3">
-                                            <p:txEl>
-                                              <p:pRg st="2" end="2"/>
-                                            </p:txEl>
-                                          </p:spTgt>
-                                        </p:tgtEl>
-                                        <p:attrNameLst>
-                                          <p:attrName>ppt_y</p:attrName>
-                                        </p:attrNameLst>
-                                      </p:cBhvr>
-                                      <p:tavLst>
-                                        <p:tav tm="0" fmla="#ppt_y-sin(pi*$)/9">
-                                          <p:val>
-                                            <p:fltVal val="0"/>
-                                          </p:val>
-                                        </p:tav>
-                                        <p:tav tm="100000">
-                                          <p:val>
-                                            <p:fltVal val="1"/>
-                                          </p:val>
-                                        </p:tav>
-                                      </p:tavLst>
-                                    </p:anim>
-                                    <p:anim calcmode="lin" valueType="num">
-                                      <p:cBhvr>
-                                        <p:cTn id="47" dur="664" tmFilter="0, 0; 0.125,0.2665; 0.25,0.4; 0.375,0.465; 0.5,0.5;  0.625,0.535; 0.75,0.6; 0.875,0.7335; 1,1">
-                                          <p:stCondLst>
-                                            <p:cond delay="2648"/>
-                                          </p:stCondLst>
-                                        </p:cTn>
-                                        <p:tgtEl>
-                                          <p:spTgt spid="3">
-                                            <p:txEl>
-                                              <p:pRg st="2" end="2"/>
-                                            </p:txEl>
-                                          </p:spTgt>
-                                        </p:tgtEl>
-                                        <p:attrNameLst>
-                                          <p:attrName>ppt_y</p:attrName>
-                                        </p:attrNameLst>
-                                      </p:cBhvr>
-                                      <p:tavLst>
-                                        <p:tav tm="0" fmla="#ppt_y-sin(pi*$)/27">
-                                          <p:val>
-                                            <p:fltVal val="0"/>
-                                          </p:val>
-                                        </p:tav>
-                                        <p:tav tm="100000">
-                                          <p:val>
-                                            <p:fltVal val="1"/>
-                                          </p:val>
-                                        </p:tav>
-                                      </p:tavLst>
-                                    </p:anim>
-                                    <p:anim calcmode="lin" valueType="num">
-                                      <p:cBhvr>
-                                        <p:cTn id="48" dur="328" tmFilter="0, 0; 0.125,0.2665; 0.25,0.4; 0.375,0.465; 0.5,0.5;  0.625,0.535; 0.75,0.6; 0.875,0.7335; 1,1">
-                                          <p:stCondLst>
-                                            <p:cond delay="3312"/>
-                                          </p:stCondLst>
-                                        </p:cTn>
-                                        <p:tgtEl>
-                                          <p:spTgt spid="3">
-                                            <p:txEl>
-                                              <p:pRg st="2" end="2"/>
-                                            </p:txEl>
-                                          </p:spTgt>
-                                        </p:tgtEl>
-                                        <p:attrNameLst>
-                                          <p:attrName>ppt_y</p:attrName>
-                                        </p:attrNameLst>
-                                      </p:cBhvr>
-                                      <p:tavLst>
-                                        <p:tav tm="0" fmla="#ppt_y-sin(pi*$)/81">
-                                          <p:val>
-                                            <p:fltVal val="0"/>
-                                          </p:val>
-                                        </p:tav>
-                                        <p:tav tm="100000">
-                                          <p:val>
-                                            <p:fltVal val="1"/>
-                                          </p:val>
-                                        </p:tav>
-                                      </p:tavLst>
-                                    </p:anim>
-                                    <p:animScale>
-                                      <p:cBhvr>
-                                        <p:cTn id="49" dur="52">
-                                          <p:stCondLst>
-                                            <p:cond delay="1300"/>
-                                          </p:stCondLst>
-                                        </p:cTn>
-                                        <p:tgtEl>
-                                          <p:spTgt spid="3">
-                                            <p:txEl>
-                                              <p:pRg st="2" end="2"/>
-                                            </p:txEl>
-                                          </p:spTgt>
-                                        </p:tgtEl>
-                                      </p:cBhvr>
-                                      <p:to x="100000" y="60000"/>
-                                    </p:animScale>
-                                    <p:animScale>
-                                      <p:cBhvr>
-                                        <p:cTn id="50" dur="332" decel="50000">
-                                          <p:stCondLst>
-                                            <p:cond delay="1352"/>
-                                          </p:stCondLst>
-                                        </p:cTn>
-                                        <p:tgtEl>
-                                          <p:spTgt spid="3">
-                                            <p:txEl>
-                                              <p:pRg st="2" end="2"/>
-                                            </p:txEl>
-                                          </p:spTgt>
-                                        </p:tgtEl>
-                                      </p:cBhvr>
-                                      <p:to x="100000" y="100000"/>
-                                    </p:animScale>
-                                    <p:animScale>
-                                      <p:cBhvr>
-                                        <p:cTn id="51" dur="52">
-                                          <p:stCondLst>
-                                            <p:cond delay="2624"/>
-                                          </p:stCondLst>
-                                        </p:cTn>
-                                        <p:tgtEl>
-                                          <p:spTgt spid="3">
-                                            <p:txEl>
-                                              <p:pRg st="2" end="2"/>
-                                            </p:txEl>
-                                          </p:spTgt>
-                                        </p:tgtEl>
-                                      </p:cBhvr>
-                                      <p:to x="100000" y="80000"/>
-                                    </p:animScale>
-                                    <p:animScale>
-                                      <p:cBhvr>
-                                        <p:cTn id="52" dur="332" decel="50000">
-                                          <p:stCondLst>
-                                            <p:cond delay="2676"/>
-                                          </p:stCondLst>
-                                        </p:cTn>
-                                        <p:tgtEl>
-                                          <p:spTgt spid="3">
-                                            <p:txEl>
-                                              <p:pRg st="2" end="2"/>
-                                            </p:txEl>
-                                          </p:spTgt>
-                                        </p:tgtEl>
-                                      </p:cBhvr>
-                                      <p:to x="100000" y="100000"/>
-                                    </p:animScale>
-                                    <p:animScale>
-                                      <p:cBhvr>
-                                        <p:cTn id="53" dur="52">
-                                          <p:stCondLst>
-                                            <p:cond delay="3284"/>
-                                          </p:stCondLst>
-                                        </p:cTn>
-                                        <p:tgtEl>
-                                          <p:spTgt spid="3">
-                                            <p:txEl>
-                                              <p:pRg st="2" end="2"/>
-                                            </p:txEl>
-                                          </p:spTgt>
-                                        </p:tgtEl>
-                                      </p:cBhvr>
-                                      <p:to x="100000" y="90000"/>
-                                    </p:animScale>
-                                    <p:animScale>
-                                      <p:cBhvr>
-                                        <p:cTn id="54" dur="332" decel="50000">
-                                          <p:stCondLst>
-                                            <p:cond delay="3336"/>
-                                          </p:stCondLst>
-                                        </p:cTn>
-                                        <p:tgtEl>
-                                          <p:spTgt spid="3">
-                                            <p:txEl>
-                                              <p:pRg st="2" end="2"/>
-                                            </p:txEl>
-                                          </p:spTgt>
-                                        </p:tgtEl>
-                                      </p:cBhvr>
-                                      <p:to x="100000" y="100000"/>
-                                    </p:animScale>
-                                    <p:animScale>
-                                      <p:cBhvr>
-                                        <p:cTn id="55" dur="52">
-                                          <p:stCondLst>
-                                            <p:cond delay="3616"/>
-                                          </p:stCondLst>
-                                        </p:cTn>
-                                        <p:tgtEl>
-                                          <p:spTgt spid="3">
-                                            <p:txEl>
-                                              <p:pRg st="2" end="2"/>
-                                            </p:txEl>
-                                          </p:spTgt>
-                                        </p:tgtEl>
-                                      </p:cBhvr>
-                                      <p:to x="100000" y="95000"/>
-                                    </p:animScale>
-                                    <p:animScale>
-                                      <p:cBhvr>
-                                        <p:cTn id="56" dur="332" decel="50000">
-                                          <p:stCondLst>
-                                            <p:cond delay="3668"/>
-                                          </p:stCondLst>
-                                        </p:cTn>
-                                        <p:tgtEl>
-                                          <p:spTgt spid="3">
-                                            <p:txEl>
-                                              <p:pRg st="2" end="2"/>
-                                            </p:txEl>
-                                          </p:spTgt>
-                                        </p:tgtEl>
-                                      </p:cBhvr>
-                                      <p:to x="100000" y="100000"/>
-                                    </p:animScale>
-                                  </p:childTnLst>
-                                </p:cTn>
-                              </p:par>
-                            </p:childTnLst>
-                          </p:cTn>
-                        </p:par>
-                      </p:childTnLst>
-                    </p:cTn>
-                  </p:par>
-                  <p:par>
-                    <p:cTn id="57" fill="hold">
-                      <p:stCondLst>
-                        <p:cond delay="indefinite"/>
-                      </p:stCondLst>
-                      <p:childTnLst>
-                        <p:par>
-                          <p:cTn id="58" fill="hold">
-                            <p:stCondLst>
-                              <p:cond delay="0"/>
-                            </p:stCondLst>
-                            <p:childTnLst>
-                              <p:par>
-                                <p:cTn id="59" presetID="26" presetClass="entr" presetSubtype="0" fill="hold" grpId="0" nodeType="clickEffect">
-                                  <p:stCondLst>
-                                    <p:cond delay="0"/>
-                                  </p:stCondLst>
-                                  <p:childTnLst>
-                                    <p:set>
-                                      <p:cBhvr>
-                                        <p:cTn id="60" dur="1" fill="hold">
-                                          <p:stCondLst>
-                                            <p:cond delay="0"/>
-                                          </p:stCondLst>
-                                        </p:cTn>
-                                        <p:tgtEl>
-                                          <p:spTgt spid="3">
-                                            <p:txEl>
-                                              <p:pRg st="3" end="3"/>
-                                            </p:txEl>
-                                          </p:spTgt>
-                                        </p:tgtEl>
-                                        <p:attrNameLst>
-                                          <p:attrName>style.visibility</p:attrName>
-                                        </p:attrNameLst>
-                                      </p:cBhvr>
-                                      <p:to>
-                                        <p:strVal val="visible"/>
-                                      </p:to>
-                                    </p:set>
-                                    <p:animEffect transition="in" filter="wipe(down)">
-                                      <p:cBhvr>
-                                        <p:cTn id="61" dur="1160">
-                                          <p:stCondLst>
-                                            <p:cond delay="0"/>
-                                          </p:stCondLst>
-                                        </p:cTn>
-                                        <p:tgtEl>
-                                          <p:spTgt spid="3">
-                                            <p:txEl>
-                                              <p:pRg st="3" end="3"/>
-                                            </p:txEl>
-                                          </p:spTgt>
-                                        </p:tgtEl>
-                                      </p:cBhvr>
-                                    </p:animEffect>
-                                    <p:anim calcmode="lin" valueType="num">
-                                      <p:cBhvr>
-                                        <p:cTn id="62" dur="3644" tmFilter="0,0; 0.14,0.36; 0.43,0.73; 0.71,0.91; 1.0,1.0">
-                                          <p:stCondLst>
-                                            <p:cond delay="0"/>
-                                          </p:stCondLst>
-                                        </p:cTn>
-                                        <p:tgtEl>
-                                          <p:spTgt spid="3">
-                                            <p:txEl>
-                                              <p:pRg st="3" end="3"/>
-                                            </p:txEl>
-                                          </p:spTgt>
-                                        </p:tgtEl>
-                                        <p:attrNameLst>
-                                          <p:attrName>ppt_x</p:attrName>
-                                        </p:attrNameLst>
-                                      </p:cBhvr>
-                                      <p:tavLst>
-                                        <p:tav tm="0">
-                                          <p:val>
-                                            <p:strVal val="#ppt_x-0.25"/>
-                                          </p:val>
-                                        </p:tav>
-                                        <p:tav tm="100000">
-                                          <p:val>
-                                            <p:strVal val="#ppt_x"/>
-                                          </p:val>
-                                        </p:tav>
-                                      </p:tavLst>
-                                    </p:anim>
-                                    <p:anim calcmode="lin" valueType="num">
-                                      <p:cBhvr>
-                                        <p:cTn id="63" dur="1328" tmFilter="0.0,0.0; 0.25,0.07; 0.50,0.2; 0.75,0.467; 1.0,1.0">
-                                          <p:stCondLst>
-                                            <p:cond delay="0"/>
-                                          </p:stCondLst>
-                                        </p:cTn>
-                                        <p:tgtEl>
-                                          <p:spTgt spid="3">
-                                            <p:txEl>
-                                              <p:pRg st="3" end="3"/>
-                                            </p:txEl>
-                                          </p:spTgt>
-                                        </p:tgtEl>
-                                        <p:attrNameLst>
-                                          <p:attrName>ppt_y</p:attrName>
-                                        </p:attrNameLst>
-                                      </p:cBhvr>
-                                      <p:tavLst>
-                                        <p:tav tm="0" fmla="#ppt_y-sin(pi*$)/3">
-                                          <p:val>
-                                            <p:fltVal val="0.5"/>
-                                          </p:val>
-                                        </p:tav>
-                                        <p:tav tm="100000">
-                                          <p:val>
-                                            <p:fltVal val="1"/>
-                                          </p:val>
-                                        </p:tav>
-                                      </p:tavLst>
-                                    </p:anim>
-                                    <p:anim calcmode="lin" valueType="num">
-                                      <p:cBhvr>
-                                        <p:cTn id="64" dur="1328" tmFilter="0, 0; 0.125,0.2665; 0.25,0.4; 0.375,0.465; 0.5,0.5;  0.625,0.535; 0.75,0.6; 0.875,0.7335; 1,1">
-                                          <p:stCondLst>
-                                            <p:cond delay="1328"/>
-                                          </p:stCondLst>
-                                        </p:cTn>
-                                        <p:tgtEl>
-                                          <p:spTgt spid="3">
-                                            <p:txEl>
-                                              <p:pRg st="3" end="3"/>
-                                            </p:txEl>
-                                          </p:spTgt>
-                                        </p:tgtEl>
-                                        <p:attrNameLst>
-                                          <p:attrName>ppt_y</p:attrName>
-                                        </p:attrNameLst>
-                                      </p:cBhvr>
-                                      <p:tavLst>
-                                        <p:tav tm="0" fmla="#ppt_y-sin(pi*$)/9">
-                                          <p:val>
-                                            <p:fltVal val="0"/>
-                                          </p:val>
-                                        </p:tav>
-                                        <p:tav tm="100000">
-                                          <p:val>
-                                            <p:fltVal val="1"/>
-                                          </p:val>
-                                        </p:tav>
-                                      </p:tavLst>
-                                    </p:anim>
-                                    <p:anim calcmode="lin" valueType="num">
-                                      <p:cBhvr>
-                                        <p:cTn id="65" dur="664" tmFilter="0, 0; 0.125,0.2665; 0.25,0.4; 0.375,0.465; 0.5,0.5;  0.625,0.535; 0.75,0.6; 0.875,0.7335; 1,1">
-                                          <p:stCondLst>
-                                            <p:cond delay="2648"/>
-                                          </p:stCondLst>
-                                        </p:cTn>
-                                        <p:tgtEl>
-                                          <p:spTgt spid="3">
-                                            <p:txEl>
-                                              <p:pRg st="3" end="3"/>
-                                            </p:txEl>
-                                          </p:spTgt>
-                                        </p:tgtEl>
-                                        <p:attrNameLst>
-                                          <p:attrName>ppt_y</p:attrName>
-                                        </p:attrNameLst>
-                                      </p:cBhvr>
-                                      <p:tavLst>
-                                        <p:tav tm="0" fmla="#ppt_y-sin(pi*$)/27">
-                                          <p:val>
-                                            <p:fltVal val="0"/>
-                                          </p:val>
-                                        </p:tav>
-                                        <p:tav tm="100000">
-                                          <p:val>
-                                            <p:fltVal val="1"/>
-                                          </p:val>
-                                        </p:tav>
-                                      </p:tavLst>
-                                    </p:anim>
-                                    <p:anim calcmode="lin" valueType="num">
-                                      <p:cBhvr>
-                                        <p:cTn id="66" dur="328" tmFilter="0, 0; 0.125,0.2665; 0.25,0.4; 0.375,0.465; 0.5,0.5;  0.625,0.535; 0.75,0.6; 0.875,0.7335; 1,1">
-                                          <p:stCondLst>
-                                            <p:cond delay="3312"/>
-                                          </p:stCondLst>
-                                        </p:cTn>
-                                        <p:tgtEl>
-                                          <p:spTgt spid="3">
-                                            <p:txEl>
-                                              <p:pRg st="3" end="3"/>
-                                            </p:txEl>
-                                          </p:spTgt>
-                                        </p:tgtEl>
-                                        <p:attrNameLst>
-                                          <p:attrName>ppt_y</p:attrName>
-                                        </p:attrNameLst>
-                                      </p:cBhvr>
-                                      <p:tavLst>
-                                        <p:tav tm="0" fmla="#ppt_y-sin(pi*$)/81">
-                                          <p:val>
-                                            <p:fltVal val="0"/>
-                                          </p:val>
-                                        </p:tav>
-                                        <p:tav tm="100000">
-                                          <p:val>
-                                            <p:fltVal val="1"/>
-                                          </p:val>
-                                        </p:tav>
-                                      </p:tavLst>
-                                    </p:anim>
-                                    <p:animScale>
-                                      <p:cBhvr>
-                                        <p:cTn id="67" dur="52">
-                                          <p:stCondLst>
-                                            <p:cond delay="1300"/>
-                                          </p:stCondLst>
-                                        </p:cTn>
-                                        <p:tgtEl>
-                                          <p:spTgt spid="3">
-                                            <p:txEl>
-                                              <p:pRg st="3" end="3"/>
-                                            </p:txEl>
-                                          </p:spTgt>
-                                        </p:tgtEl>
-                                      </p:cBhvr>
-                                      <p:to x="100000" y="60000"/>
-                                    </p:animScale>
-                                    <p:animScale>
-                                      <p:cBhvr>
-                                        <p:cTn id="68" dur="332" decel="50000">
-                                          <p:stCondLst>
-                                            <p:cond delay="1352"/>
-                                          </p:stCondLst>
-                                        </p:cTn>
-                                        <p:tgtEl>
-                                          <p:spTgt spid="3">
-                                            <p:txEl>
-                                              <p:pRg st="3" end="3"/>
-                                            </p:txEl>
-                                          </p:spTgt>
-                                        </p:tgtEl>
-                                      </p:cBhvr>
-                                      <p:to x="100000" y="100000"/>
-                                    </p:animScale>
-                                    <p:animScale>
-                                      <p:cBhvr>
-                                        <p:cTn id="69" dur="52">
-                                          <p:stCondLst>
-                                            <p:cond delay="2624"/>
-                                          </p:stCondLst>
-                                        </p:cTn>
-                                        <p:tgtEl>
-                                          <p:spTgt spid="3">
-                                            <p:txEl>
-                                              <p:pRg st="3" end="3"/>
-                                            </p:txEl>
-                                          </p:spTgt>
-                                        </p:tgtEl>
-                                      </p:cBhvr>
-                                      <p:to x="100000" y="80000"/>
-                                    </p:animScale>
-                                    <p:animScale>
-                                      <p:cBhvr>
-                                        <p:cTn id="70" dur="332" decel="50000">
-                                          <p:stCondLst>
-                                            <p:cond delay="2676"/>
-                                          </p:stCondLst>
-                                        </p:cTn>
-                                        <p:tgtEl>
-                                          <p:spTgt spid="3">
-                                            <p:txEl>
-                                              <p:pRg st="3" end="3"/>
-                                            </p:txEl>
-                                          </p:spTgt>
-                                        </p:tgtEl>
-                                      </p:cBhvr>
-                                      <p:to x="100000" y="100000"/>
-                                    </p:animScale>
-                                    <p:animScale>
-                                      <p:cBhvr>
-                                        <p:cTn id="71" dur="52">
-                                          <p:stCondLst>
-                                            <p:cond delay="3284"/>
-                                          </p:stCondLst>
-                                        </p:cTn>
-                                        <p:tgtEl>
-                                          <p:spTgt spid="3">
-                                            <p:txEl>
-                                              <p:pRg st="3" end="3"/>
-                                            </p:txEl>
-                                          </p:spTgt>
-                                        </p:tgtEl>
-                                      </p:cBhvr>
-                                      <p:to x="100000" y="90000"/>
-                                    </p:animScale>
-                                    <p:animScale>
-                                      <p:cBhvr>
-                                        <p:cTn id="72" dur="332" decel="50000">
-                                          <p:stCondLst>
-                                            <p:cond delay="3336"/>
-                                          </p:stCondLst>
-                                        </p:cTn>
-                                        <p:tgtEl>
-                                          <p:spTgt spid="3">
-                                            <p:txEl>
-                                              <p:pRg st="3" end="3"/>
-                                            </p:txEl>
-                                          </p:spTgt>
-                                        </p:tgtEl>
-                                      </p:cBhvr>
-                                      <p:to x="100000" y="100000"/>
-                                    </p:animScale>
-                                    <p:animScale>
-                                      <p:cBhvr>
-                                        <p:cTn id="73" dur="52">
-                                          <p:stCondLst>
-                                            <p:cond delay="3616"/>
-                                          </p:stCondLst>
-                                        </p:cTn>
-                                        <p:tgtEl>
-                                          <p:spTgt spid="3">
-                                            <p:txEl>
-                                              <p:pRg st="3" end="3"/>
-                                            </p:txEl>
-                                          </p:spTgt>
-                                        </p:tgtEl>
-                                      </p:cBhvr>
-                                      <p:to x="100000" y="95000"/>
-                                    </p:animScale>
-                                    <p:animScale>
-                                      <p:cBhvr>
-                                        <p:cTn id="74" dur="332" decel="50000">
-                                          <p:stCondLst>
-                                            <p:cond delay="3668"/>
-                                          </p:stCondLst>
-                                        </p:cTn>
-                                        <p:tgtEl>
-                                          <p:spTgt spid="3">
-                                            <p:txEl>
-                                              <p:pRg st="3" end="3"/>
-                                            </p:txEl>
-                                          </p:spTgt>
-                                        </p:tgtEl>
-                                      </p:cBhvr>
-                                      <p:to x="100000" y="100000"/>
-                                    </p:animScale>
-                                  </p:childTnLst>
-                                </p:cTn>
-                              </p:par>
-                            </p:childTnLst>
-                          </p:cTn>
-                        </p:par>
-                      </p:childTnLst>
-                    </p:cTn>
-                  </p:par>
-                </p:childTnLst>
-              </p:cTn>
-              <p:prevCondLst>
-                <p:cond evt="onPrev" delay="0">
-                  <p:tgtEl>
-                    <p:sldTgt/>
-                  </p:tgtEl>
-                </p:cond>
-              </p:prevCondLst>
-              <p:nextCondLst>
-                <p:cond evt="onNext" delay="0">
-                  <p:tgtEl>
-                    <p:sldTgt/>
-                  </p:tgtEl>
-                </p:cond>
-              </p:nextCondLst>
-            </p:seq>
-          </p:childTnLst>
-        </p:cTn>
+        <p:cTn id="1" dur="indefinite" restart="never" nodeType="tmRoot"/>
       </p:par>
     </p:tnLst>
-    <p:bldLst>
-      <p:bldP spid="3" grpId="0" build="p"/>
-    </p:bldLst>
   </p:timing>
 </p:sld>
 </file>

</xml_diff>